<commit_message>
updated slide deck pptx
</commit_message>
<xml_diff>
--- a/CHOP.pptx
+++ b/CHOP.pptx
@@ -18,56 +18,68 @@
     <p:sldId id="262" r:id="rId13"/>
     <p:sldId id="263" r:id="rId14"/>
     <p:sldId id="264" r:id="rId15"/>
+    <p:sldId id="265" r:id="rId16"/>
+    <p:sldId id="266" r:id="rId17"/>
+    <p:sldId id="267" r:id="rId18"/>
+    <p:sldId id="268" r:id="rId19"/>
+    <p:sldId id="269" r:id="rId20"/>
   </p:sldIdLst>
   <p:sldSz cy="5143500" cx="9144000"/>
   <p:notesSz cx="6858000" cy="9144000"/>
   <p:embeddedFontLst>
     <p:embeddedFont>
       <p:font typeface="Hanken Grotesk"/>
-      <p:regular r:id="rId16"/>
-      <p:bold r:id="rId17"/>
-      <p:italic r:id="rId18"/>
-      <p:boldItalic r:id="rId19"/>
+      <p:regular r:id="rId21"/>
+      <p:bold r:id="rId22"/>
+      <p:italic r:id="rId23"/>
+      <p:boldItalic r:id="rId24"/>
     </p:embeddedFont>
     <p:embeddedFont>
       <p:font typeface="Poppins"/>
-      <p:regular r:id="rId20"/>
-      <p:bold r:id="rId21"/>
-      <p:italic r:id="rId22"/>
-      <p:boldItalic r:id="rId23"/>
+      <p:regular r:id="rId25"/>
+      <p:bold r:id="rId26"/>
+      <p:italic r:id="rId27"/>
+      <p:boldItalic r:id="rId28"/>
     </p:embeddedFont>
     <p:embeddedFont>
       <p:font typeface="Montserrat"/>
-      <p:regular r:id="rId24"/>
-      <p:bold r:id="rId25"/>
-      <p:italic r:id="rId26"/>
-      <p:boldItalic r:id="rId27"/>
+      <p:regular r:id="rId29"/>
+      <p:bold r:id="rId30"/>
+      <p:italic r:id="rId31"/>
+      <p:boldItalic r:id="rId32"/>
+    </p:embeddedFont>
+    <p:embeddedFont>
+      <p:font typeface="Inter"/>
+      <p:regular r:id="rId33"/>
+      <p:bold r:id="rId34"/>
+      <p:italic r:id="rId35"/>
+      <p:boldItalic r:id="rId36"/>
     </p:embeddedFont>
     <p:embeddedFont>
       <p:font typeface="Lato Light"/>
-      <p:regular r:id="rId28"/>
-      <p:bold r:id="rId29"/>
-      <p:italic r:id="rId30"/>
-      <p:boldItalic r:id="rId31"/>
+      <p:regular r:id="rId37"/>
+      <p:bold r:id="rId38"/>
+      <p:italic r:id="rId39"/>
+      <p:boldItalic r:id="rId40"/>
     </p:embeddedFont>
     <p:embeddedFont>
       <p:font typeface="Open Sans Medium"/>
-      <p:regular r:id="rId32"/>
-      <p:bold r:id="rId33"/>
-      <p:italic r:id="rId34"/>
-      <p:boldItalic r:id="rId35"/>
+      <p:regular r:id="rId41"/>
+      <p:bold r:id="rId42"/>
+      <p:italic r:id="rId43"/>
+      <p:boldItalic r:id="rId44"/>
     </p:embeddedFont>
     <p:embeddedFont>
       <p:font typeface="Inter Medium"/>
-      <p:regular r:id="rId36"/>
-      <p:bold r:id="rId37"/>
-      <p:italic r:id="rId38"/>
-      <p:boldItalic r:id="rId39"/>
+      <p:regular r:id="rId45"/>
+      <p:bold r:id="rId46"/>
+      <p:italic r:id="rId47"/>
+      <p:boldItalic r:id="rId48"/>
     </p:embeddedFont>
     <p:embeddedFont>
       <p:font typeface="Space Grotesk"/>
-      <p:regular r:id="rId40"/>
-      <p:bold r:id="rId41"/>
+      <p:regular r:id="rId49"/>
+      <p:bold r:id="rId50"/>
     </p:embeddedFont>
   </p:embeddedFontLst>
   <p:defaultTextStyle>
@@ -843,12 +855,12 @@
 </p:notes>
 </file>
 
-<file path=ppt/notesSlides/notesSlide2.xml><?xml version="1.0" encoding="utf-8"?>
+<file path=ppt/notesSlides/notesSlide10.xml><?xml version="1.0" encoding="utf-8"?>
 <p:notes xmlns:a="http://schemas.openxmlformats.org/drawingml/2006/main" xmlns:r="http://schemas.openxmlformats.org/officeDocument/2006/relationships" xmlns:mc="http://schemas.openxmlformats.org/markup-compatibility/2006" xmlns:mv="urn:schemas-microsoft-com:mac:vml" xmlns:p="http://schemas.openxmlformats.org/presentationml/2006/main" xmlns:c="http://schemas.openxmlformats.org/drawingml/2006/chart" xmlns:dgm="http://schemas.openxmlformats.org/drawingml/2006/diagram" xmlns:o="urn:schemas-microsoft-com:office:office" xmlns:v="urn:schemas-microsoft-com:vml" xmlns:pvml="urn:schemas-microsoft-com:office:powerpoint" xmlns:com="http://schemas.openxmlformats.org/drawingml/2006/compatibility" xmlns:p14="http://schemas.microsoft.com/office/powerpoint/2010/main" xmlns:p15="http://schemas.microsoft.com/office/powerpoint/2012/main" xmlns:ahyp="http://schemas.microsoft.com/office/drawing/2018/hyperlinkcolor" showMasterPhAnim="0" showMasterSp="0">
   <p:cSld>
     <p:spTree>
       <p:nvGrpSpPr>
-        <p:cNvPr id="186" name="Shape 186"/>
+        <p:cNvPr id="248" name="Shape 248"/>
         <p:cNvGrpSpPr/>
         <p:nvPr/>
       </p:nvGrpSpPr>
@@ -862,7 +874,7 @@
       </p:grpSpPr>
       <p:sp>
         <p:nvSpPr>
-          <p:cNvPr id="187" name="Google Shape;187;SLIDES_API672897434_6:notes"/>
+          <p:cNvPr id="249" name="Google Shape;249;SLIDES_API672897434_41:notes"/>
           <p:cNvSpPr/>
           <p:nvPr>
             <p:ph idx="2" type="sldImg"/>
@@ -897,7 +909,7 @@
       </p:sp>
       <p:sp>
         <p:nvSpPr>
-          <p:cNvPr id="188" name="Google Shape;188;SLIDES_API672897434_6:notes"/>
+          <p:cNvPr id="250" name="Google Shape;250;SLIDES_API672897434_41:notes"/>
           <p:cNvSpPr txBox="1"/>
           <p:nvPr>
             <p:ph idx="1" type="body"/>
@@ -942,12 +954,12 @@
 </p:notes>
 </file>
 
-<file path=ppt/notesSlides/notesSlide3.xml><?xml version="1.0" encoding="utf-8"?>
+<file path=ppt/notesSlides/notesSlide11.xml><?xml version="1.0" encoding="utf-8"?>
 <p:notes xmlns:a="http://schemas.openxmlformats.org/drawingml/2006/main" xmlns:r="http://schemas.openxmlformats.org/officeDocument/2006/relationships" xmlns:mc="http://schemas.openxmlformats.org/markup-compatibility/2006" xmlns:mv="urn:schemas-microsoft-com:mac:vml" xmlns:p="http://schemas.openxmlformats.org/presentationml/2006/main" xmlns:c="http://schemas.openxmlformats.org/drawingml/2006/chart" xmlns:dgm="http://schemas.openxmlformats.org/drawingml/2006/diagram" xmlns:o="urn:schemas-microsoft-com:office:office" xmlns:v="urn:schemas-microsoft-com:vml" xmlns:pvml="urn:schemas-microsoft-com:office:powerpoint" xmlns:com="http://schemas.openxmlformats.org/drawingml/2006/compatibility" xmlns:p14="http://schemas.microsoft.com/office/powerpoint/2010/main" xmlns:p15="http://schemas.microsoft.com/office/powerpoint/2012/main" xmlns:ahyp="http://schemas.microsoft.com/office/drawing/2018/hyperlinkcolor" showMasterPhAnim="0" showMasterSp="0">
   <p:cSld>
     <p:spTree>
       <p:nvGrpSpPr>
-        <p:cNvPr id="195" name="Shape 195"/>
+        <p:cNvPr id="256" name="Shape 256"/>
         <p:cNvGrpSpPr/>
         <p:nvPr/>
       </p:nvGrpSpPr>
@@ -961,7 +973,7 @@
       </p:grpSpPr>
       <p:sp>
         <p:nvSpPr>
-          <p:cNvPr id="196" name="Google Shape;196;SLIDES_API672897434_14:notes"/>
+          <p:cNvPr id="257" name="Google Shape;257;g2f49d5295ec_0_28:notes"/>
           <p:cNvSpPr/>
           <p:nvPr>
             <p:ph idx="2" type="sldImg"/>
@@ -996,7 +1008,7 @@
       </p:sp>
       <p:sp>
         <p:nvSpPr>
-          <p:cNvPr id="197" name="Google Shape;197;SLIDES_API672897434_14:notes"/>
+          <p:cNvPr id="258" name="Google Shape;258;g2f49d5295ec_0_28:notes"/>
           <p:cNvSpPr txBox="1"/>
           <p:nvPr>
             <p:ph idx="1" type="body"/>
@@ -1041,12 +1053,12 @@
 </p:notes>
 </file>
 
-<file path=ppt/notesSlides/notesSlide4.xml><?xml version="1.0" encoding="utf-8"?>
+<file path=ppt/notesSlides/notesSlide12.xml><?xml version="1.0" encoding="utf-8"?>
 <p:notes xmlns:a="http://schemas.openxmlformats.org/drawingml/2006/main" xmlns:r="http://schemas.openxmlformats.org/officeDocument/2006/relationships" xmlns:mc="http://schemas.openxmlformats.org/markup-compatibility/2006" xmlns:mv="urn:schemas-microsoft-com:mac:vml" xmlns:p="http://schemas.openxmlformats.org/presentationml/2006/main" xmlns:c="http://schemas.openxmlformats.org/drawingml/2006/chart" xmlns:dgm="http://schemas.openxmlformats.org/drawingml/2006/diagram" xmlns:o="urn:schemas-microsoft-com:office:office" xmlns:v="urn:schemas-microsoft-com:vml" xmlns:pvml="urn:schemas-microsoft-com:office:powerpoint" xmlns:com="http://schemas.openxmlformats.org/drawingml/2006/compatibility" xmlns:p14="http://schemas.microsoft.com/office/powerpoint/2010/main" xmlns:p15="http://schemas.microsoft.com/office/powerpoint/2012/main" xmlns:ahyp="http://schemas.microsoft.com/office/drawing/2018/hyperlinkcolor" showMasterPhAnim="0" showMasterSp="0">
   <p:cSld>
     <p:spTree>
       <p:nvGrpSpPr>
-        <p:cNvPr id="203" name="Shape 203"/>
+        <p:cNvPr id="264" name="Shape 264"/>
         <p:cNvGrpSpPr/>
         <p:nvPr/>
       </p:nvGrpSpPr>
@@ -1060,7 +1072,7 @@
       </p:grpSpPr>
       <p:sp>
         <p:nvSpPr>
-          <p:cNvPr id="204" name="Google Shape;204;SLIDES_API672897434_21:notes"/>
+          <p:cNvPr id="265" name="Google Shape;265;g2f49d5295ec_0_35:notes"/>
           <p:cNvSpPr/>
           <p:nvPr>
             <p:ph idx="2" type="sldImg"/>
@@ -1095,7 +1107,7 @@
       </p:sp>
       <p:sp>
         <p:nvSpPr>
-          <p:cNvPr id="205" name="Google Shape;205;SLIDES_API672897434_21:notes"/>
+          <p:cNvPr id="266" name="Google Shape;266;g2f49d5295ec_0_35:notes"/>
           <p:cNvSpPr txBox="1"/>
           <p:nvPr>
             <p:ph idx="1" type="body"/>
@@ -1140,12 +1152,12 @@
 </p:notes>
 </file>
 
-<file path=ppt/notesSlides/notesSlide5.xml><?xml version="1.0" encoding="utf-8"?>
+<file path=ppt/notesSlides/notesSlide13.xml><?xml version="1.0" encoding="utf-8"?>
 <p:notes xmlns:a="http://schemas.openxmlformats.org/drawingml/2006/main" xmlns:r="http://schemas.openxmlformats.org/officeDocument/2006/relationships" xmlns:mc="http://schemas.openxmlformats.org/markup-compatibility/2006" xmlns:mv="urn:schemas-microsoft-com:mac:vml" xmlns:p="http://schemas.openxmlformats.org/presentationml/2006/main" xmlns:c="http://schemas.openxmlformats.org/drawingml/2006/chart" xmlns:dgm="http://schemas.openxmlformats.org/drawingml/2006/diagram" xmlns:o="urn:schemas-microsoft-com:office:office" xmlns:v="urn:schemas-microsoft-com:vml" xmlns:pvml="urn:schemas-microsoft-com:office:powerpoint" xmlns:com="http://schemas.openxmlformats.org/drawingml/2006/compatibility" xmlns:p14="http://schemas.microsoft.com/office/powerpoint/2010/main" xmlns:p15="http://schemas.microsoft.com/office/powerpoint/2012/main" xmlns:ahyp="http://schemas.microsoft.com/office/drawing/2018/hyperlinkcolor" showMasterPhAnim="0" showMasterSp="0">
   <p:cSld>
     <p:spTree>
       <p:nvGrpSpPr>
-        <p:cNvPr id="210" name="Shape 210"/>
+        <p:cNvPr id="272" name="Shape 272"/>
         <p:cNvGrpSpPr/>
         <p:nvPr/>
       </p:nvGrpSpPr>
@@ -1159,7 +1171,7 @@
       </p:grpSpPr>
       <p:sp>
         <p:nvSpPr>
-          <p:cNvPr id="211" name="Google Shape;211;SLIDES_API672897434_27:notes"/>
+          <p:cNvPr id="273" name="Google Shape;273;SLIDES_API672897434_48:notes"/>
           <p:cNvSpPr/>
           <p:nvPr>
             <p:ph idx="2" type="sldImg"/>
@@ -1194,7 +1206,502 @@
       </p:sp>
       <p:sp>
         <p:nvSpPr>
-          <p:cNvPr id="212" name="Google Shape;212;SLIDES_API672897434_27:notes"/>
+          <p:cNvPr id="274" name="Google Shape;274;SLIDES_API672897434_48:notes"/>
+          <p:cNvSpPr txBox="1"/>
+          <p:nvPr>
+            <p:ph idx="1" type="body"/>
+          </p:nvPr>
+        </p:nvSpPr>
+        <p:spPr>
+          <a:xfrm>
+            <a:off x="685800" y="4343400"/>
+            <a:ext cx="5486400" cy="4114800"/>
+          </a:xfrm>
+          <a:prstGeom prst="rect">
+            <a:avLst/>
+          </a:prstGeom>
+        </p:spPr>
+        <p:txBody>
+          <a:bodyPr anchorCtr="0" anchor="t" bIns="91425" lIns="91425" spcFirstLastPara="1" rIns="91425" wrap="square" tIns="91425">
+            <a:noAutofit/>
+          </a:bodyPr>
+          <a:lstStyle/>
+          <a:p>
+            <a:pPr indent="0" lvl="0" marL="0" rtl="0" algn="l">
+              <a:spcBef>
+                <a:spcPts val="0"/>
+              </a:spcBef>
+              <a:spcAft>
+                <a:spcPts val="0"/>
+              </a:spcAft>
+              <a:buNone/>
+            </a:pPr>
+            <a:r>
+              <a:t/>
+            </a:r>
+            <a:endParaRPr/>
+          </a:p>
+        </p:txBody>
+      </p:sp>
+    </p:spTree>
+  </p:cSld>
+  <p:clrMapOvr>
+    <a:masterClrMapping/>
+  </p:clrMapOvr>
+</p:notes>
+</file>
+
+<file path=ppt/notesSlides/notesSlide14.xml><?xml version="1.0" encoding="utf-8"?>
+<p:notes xmlns:a="http://schemas.openxmlformats.org/drawingml/2006/main" xmlns:r="http://schemas.openxmlformats.org/officeDocument/2006/relationships" xmlns:mc="http://schemas.openxmlformats.org/markup-compatibility/2006" xmlns:mv="urn:schemas-microsoft-com:mac:vml" xmlns:p="http://schemas.openxmlformats.org/presentationml/2006/main" xmlns:c="http://schemas.openxmlformats.org/drawingml/2006/chart" xmlns:dgm="http://schemas.openxmlformats.org/drawingml/2006/diagram" xmlns:o="urn:schemas-microsoft-com:office:office" xmlns:v="urn:schemas-microsoft-com:vml" xmlns:pvml="urn:schemas-microsoft-com:office:powerpoint" xmlns:com="http://schemas.openxmlformats.org/drawingml/2006/compatibility" xmlns:p14="http://schemas.microsoft.com/office/powerpoint/2010/main" xmlns:p15="http://schemas.microsoft.com/office/powerpoint/2012/main" xmlns:ahyp="http://schemas.microsoft.com/office/drawing/2018/hyperlinkcolor" showMasterPhAnim="0" showMasterSp="0">
+  <p:cSld>
+    <p:spTree>
+      <p:nvGrpSpPr>
+        <p:cNvPr id="282" name="Shape 282"/>
+        <p:cNvGrpSpPr/>
+        <p:nvPr/>
+      </p:nvGrpSpPr>
+      <p:grpSpPr>
+        <a:xfrm>
+          <a:off x="0" y="0"/>
+          <a:ext cx="0" cy="0"/>
+          <a:chOff x="0" y="0"/>
+          <a:chExt cx="0" cy="0"/>
+        </a:xfrm>
+      </p:grpSpPr>
+      <p:sp>
+        <p:nvSpPr>
+          <p:cNvPr id="283" name="Google Shape;283;SLIDES_API672897434_57:notes"/>
+          <p:cNvSpPr/>
+          <p:nvPr>
+            <p:ph idx="2" type="sldImg"/>
+          </p:nvPr>
+        </p:nvSpPr>
+        <p:spPr>
+          <a:xfrm>
+            <a:off x="381300" y="685800"/>
+            <a:ext cx="6096000" cy="3429000"/>
+          </a:xfrm>
+          <a:custGeom>
+            <a:rect b="b" l="l" r="r" t="t"/>
+            <a:pathLst>
+              <a:path extrusionOk="0" h="120000" w="120000">
+                <a:moveTo>
+                  <a:pt x="0" y="0"/>
+                </a:moveTo>
+                <a:lnTo>
+                  <a:pt x="120000" y="0"/>
+                </a:lnTo>
+                <a:lnTo>
+                  <a:pt x="120000" y="120000"/>
+                </a:lnTo>
+                <a:lnTo>
+                  <a:pt x="0" y="120000"/>
+                </a:lnTo>
+                <a:close/>
+              </a:path>
+            </a:pathLst>
+          </a:custGeom>
+        </p:spPr>
+      </p:sp>
+      <p:sp>
+        <p:nvSpPr>
+          <p:cNvPr id="284" name="Google Shape;284;SLIDES_API672897434_57:notes"/>
+          <p:cNvSpPr txBox="1"/>
+          <p:nvPr>
+            <p:ph idx="1" type="body"/>
+          </p:nvPr>
+        </p:nvSpPr>
+        <p:spPr>
+          <a:xfrm>
+            <a:off x="685800" y="4343400"/>
+            <a:ext cx="5486400" cy="4114800"/>
+          </a:xfrm>
+          <a:prstGeom prst="rect">
+            <a:avLst/>
+          </a:prstGeom>
+        </p:spPr>
+        <p:txBody>
+          <a:bodyPr anchorCtr="0" anchor="t" bIns="91425" lIns="91425" spcFirstLastPara="1" rIns="91425" wrap="square" tIns="91425">
+            <a:noAutofit/>
+          </a:bodyPr>
+          <a:lstStyle/>
+          <a:p>
+            <a:pPr indent="0" lvl="0" marL="0" rtl="0" algn="l">
+              <a:spcBef>
+                <a:spcPts val="0"/>
+              </a:spcBef>
+              <a:spcAft>
+                <a:spcPts val="0"/>
+              </a:spcAft>
+              <a:buNone/>
+            </a:pPr>
+            <a:r>
+              <a:t/>
+            </a:r>
+            <a:endParaRPr/>
+          </a:p>
+        </p:txBody>
+      </p:sp>
+    </p:spTree>
+  </p:cSld>
+  <p:clrMapOvr>
+    <a:masterClrMapping/>
+  </p:clrMapOvr>
+</p:notes>
+</file>
+
+<file path=ppt/notesSlides/notesSlide2.xml><?xml version="1.0" encoding="utf-8"?>
+<p:notes xmlns:a="http://schemas.openxmlformats.org/drawingml/2006/main" xmlns:r="http://schemas.openxmlformats.org/officeDocument/2006/relationships" xmlns:mc="http://schemas.openxmlformats.org/markup-compatibility/2006" xmlns:mv="urn:schemas-microsoft-com:mac:vml" xmlns:p="http://schemas.openxmlformats.org/presentationml/2006/main" xmlns:c="http://schemas.openxmlformats.org/drawingml/2006/chart" xmlns:dgm="http://schemas.openxmlformats.org/drawingml/2006/diagram" xmlns:o="urn:schemas-microsoft-com:office:office" xmlns:v="urn:schemas-microsoft-com:vml" xmlns:pvml="urn:schemas-microsoft-com:office:powerpoint" xmlns:com="http://schemas.openxmlformats.org/drawingml/2006/compatibility" xmlns:p14="http://schemas.microsoft.com/office/powerpoint/2010/main" xmlns:p15="http://schemas.microsoft.com/office/powerpoint/2012/main" xmlns:ahyp="http://schemas.microsoft.com/office/drawing/2018/hyperlinkcolor" showMasterPhAnim="0" showMasterSp="0">
+  <p:cSld>
+    <p:spTree>
+      <p:nvGrpSpPr>
+        <p:cNvPr id="186" name="Shape 186"/>
+        <p:cNvGrpSpPr/>
+        <p:nvPr/>
+      </p:nvGrpSpPr>
+      <p:grpSpPr>
+        <a:xfrm>
+          <a:off x="0" y="0"/>
+          <a:ext cx="0" cy="0"/>
+          <a:chOff x="0" y="0"/>
+          <a:chExt cx="0" cy="0"/>
+        </a:xfrm>
+      </p:grpSpPr>
+      <p:sp>
+        <p:nvSpPr>
+          <p:cNvPr id="187" name="Google Shape;187;g2f49d5295ec_0_55:notes"/>
+          <p:cNvSpPr/>
+          <p:nvPr>
+            <p:ph idx="2" type="sldImg"/>
+          </p:nvPr>
+        </p:nvSpPr>
+        <p:spPr>
+          <a:xfrm>
+            <a:off x="381300" y="685800"/>
+            <a:ext cx="6096000" cy="3429000"/>
+          </a:xfrm>
+          <a:custGeom>
+            <a:rect b="b" l="l" r="r" t="t"/>
+            <a:pathLst>
+              <a:path extrusionOk="0" h="120000" w="120000">
+                <a:moveTo>
+                  <a:pt x="0" y="0"/>
+                </a:moveTo>
+                <a:lnTo>
+                  <a:pt x="120000" y="0"/>
+                </a:lnTo>
+                <a:lnTo>
+                  <a:pt x="120000" y="120000"/>
+                </a:lnTo>
+                <a:lnTo>
+                  <a:pt x="0" y="120000"/>
+                </a:lnTo>
+                <a:close/>
+              </a:path>
+            </a:pathLst>
+          </a:custGeom>
+        </p:spPr>
+      </p:sp>
+      <p:sp>
+        <p:nvSpPr>
+          <p:cNvPr id="188" name="Google Shape;188;g2f49d5295ec_0_55:notes"/>
+          <p:cNvSpPr txBox="1"/>
+          <p:nvPr>
+            <p:ph idx="1" type="body"/>
+          </p:nvPr>
+        </p:nvSpPr>
+        <p:spPr>
+          <a:xfrm>
+            <a:off x="685800" y="4343400"/>
+            <a:ext cx="5486400" cy="4114800"/>
+          </a:xfrm>
+          <a:prstGeom prst="rect">
+            <a:avLst/>
+          </a:prstGeom>
+        </p:spPr>
+        <p:txBody>
+          <a:bodyPr anchorCtr="0" anchor="t" bIns="91425" lIns="91425" spcFirstLastPara="1" rIns="91425" wrap="square" tIns="91425">
+            <a:noAutofit/>
+          </a:bodyPr>
+          <a:lstStyle/>
+          <a:p>
+            <a:pPr indent="0" lvl="0" marL="0" rtl="0" algn="l">
+              <a:spcBef>
+                <a:spcPts val="0"/>
+              </a:spcBef>
+              <a:spcAft>
+                <a:spcPts val="0"/>
+              </a:spcAft>
+              <a:buNone/>
+            </a:pPr>
+            <a:r>
+              <a:t/>
+            </a:r>
+            <a:endParaRPr/>
+          </a:p>
+        </p:txBody>
+      </p:sp>
+    </p:spTree>
+  </p:cSld>
+  <p:clrMapOvr>
+    <a:masterClrMapping/>
+  </p:clrMapOvr>
+</p:notes>
+</file>
+
+<file path=ppt/notesSlides/notesSlide3.xml><?xml version="1.0" encoding="utf-8"?>
+<p:notes xmlns:a="http://schemas.openxmlformats.org/drawingml/2006/main" xmlns:r="http://schemas.openxmlformats.org/officeDocument/2006/relationships" xmlns:mc="http://schemas.openxmlformats.org/markup-compatibility/2006" xmlns:mv="urn:schemas-microsoft-com:mac:vml" xmlns:p="http://schemas.openxmlformats.org/presentationml/2006/main" xmlns:c="http://schemas.openxmlformats.org/drawingml/2006/chart" xmlns:dgm="http://schemas.openxmlformats.org/drawingml/2006/diagram" xmlns:o="urn:schemas-microsoft-com:office:office" xmlns:v="urn:schemas-microsoft-com:vml" xmlns:pvml="urn:schemas-microsoft-com:office:powerpoint" xmlns:com="http://schemas.openxmlformats.org/drawingml/2006/compatibility" xmlns:p14="http://schemas.microsoft.com/office/powerpoint/2010/main" xmlns:p15="http://schemas.microsoft.com/office/powerpoint/2012/main" xmlns:ahyp="http://schemas.microsoft.com/office/drawing/2018/hyperlinkcolor" showMasterPhAnim="0" showMasterSp="0">
+  <p:cSld>
+    <p:spTree>
+      <p:nvGrpSpPr>
+        <p:cNvPr id="192" name="Shape 192"/>
+        <p:cNvGrpSpPr/>
+        <p:nvPr/>
+      </p:nvGrpSpPr>
+      <p:grpSpPr>
+        <a:xfrm>
+          <a:off x="0" y="0"/>
+          <a:ext cx="0" cy="0"/>
+          <a:chOff x="0" y="0"/>
+          <a:chExt cx="0" cy="0"/>
+        </a:xfrm>
+      </p:grpSpPr>
+      <p:sp>
+        <p:nvSpPr>
+          <p:cNvPr id="193" name="Google Shape;193;SLIDES_API672897434_6:notes"/>
+          <p:cNvSpPr/>
+          <p:nvPr>
+            <p:ph idx="2" type="sldImg"/>
+          </p:nvPr>
+        </p:nvSpPr>
+        <p:spPr>
+          <a:xfrm>
+            <a:off x="381300" y="685800"/>
+            <a:ext cx="6096000" cy="3429000"/>
+          </a:xfrm>
+          <a:custGeom>
+            <a:rect b="b" l="l" r="r" t="t"/>
+            <a:pathLst>
+              <a:path extrusionOk="0" h="120000" w="120000">
+                <a:moveTo>
+                  <a:pt x="0" y="0"/>
+                </a:moveTo>
+                <a:lnTo>
+                  <a:pt x="120000" y="0"/>
+                </a:lnTo>
+                <a:lnTo>
+                  <a:pt x="120000" y="120000"/>
+                </a:lnTo>
+                <a:lnTo>
+                  <a:pt x="0" y="120000"/>
+                </a:lnTo>
+                <a:close/>
+              </a:path>
+            </a:pathLst>
+          </a:custGeom>
+        </p:spPr>
+      </p:sp>
+      <p:sp>
+        <p:nvSpPr>
+          <p:cNvPr id="194" name="Google Shape;194;SLIDES_API672897434_6:notes"/>
+          <p:cNvSpPr txBox="1"/>
+          <p:nvPr>
+            <p:ph idx="1" type="body"/>
+          </p:nvPr>
+        </p:nvSpPr>
+        <p:spPr>
+          <a:xfrm>
+            <a:off x="685800" y="4343400"/>
+            <a:ext cx="5486400" cy="4114800"/>
+          </a:xfrm>
+          <a:prstGeom prst="rect">
+            <a:avLst/>
+          </a:prstGeom>
+        </p:spPr>
+        <p:txBody>
+          <a:bodyPr anchorCtr="0" anchor="t" bIns="91425" lIns="91425" spcFirstLastPara="1" rIns="91425" wrap="square" tIns="91425">
+            <a:noAutofit/>
+          </a:bodyPr>
+          <a:lstStyle/>
+          <a:p>
+            <a:pPr indent="0" lvl="0" marL="0" rtl="0" algn="l">
+              <a:spcBef>
+                <a:spcPts val="0"/>
+              </a:spcBef>
+              <a:spcAft>
+                <a:spcPts val="0"/>
+              </a:spcAft>
+              <a:buNone/>
+            </a:pPr>
+            <a:r>
+              <a:t/>
+            </a:r>
+            <a:endParaRPr/>
+          </a:p>
+        </p:txBody>
+      </p:sp>
+    </p:spTree>
+  </p:cSld>
+  <p:clrMapOvr>
+    <a:masterClrMapping/>
+  </p:clrMapOvr>
+</p:notes>
+</file>
+
+<file path=ppt/notesSlides/notesSlide4.xml><?xml version="1.0" encoding="utf-8"?>
+<p:notes xmlns:a="http://schemas.openxmlformats.org/drawingml/2006/main" xmlns:r="http://schemas.openxmlformats.org/officeDocument/2006/relationships" xmlns:mc="http://schemas.openxmlformats.org/markup-compatibility/2006" xmlns:mv="urn:schemas-microsoft-com:mac:vml" xmlns:p="http://schemas.openxmlformats.org/presentationml/2006/main" xmlns:c="http://schemas.openxmlformats.org/drawingml/2006/chart" xmlns:dgm="http://schemas.openxmlformats.org/drawingml/2006/diagram" xmlns:o="urn:schemas-microsoft-com:office:office" xmlns:v="urn:schemas-microsoft-com:vml" xmlns:pvml="urn:schemas-microsoft-com:office:powerpoint" xmlns:com="http://schemas.openxmlformats.org/drawingml/2006/compatibility" xmlns:p14="http://schemas.microsoft.com/office/powerpoint/2010/main" xmlns:p15="http://schemas.microsoft.com/office/powerpoint/2012/main" xmlns:ahyp="http://schemas.microsoft.com/office/drawing/2018/hyperlinkcolor" showMasterPhAnim="0" showMasterSp="0">
+  <p:cSld>
+    <p:spTree>
+      <p:nvGrpSpPr>
+        <p:cNvPr id="201" name="Shape 201"/>
+        <p:cNvGrpSpPr/>
+        <p:nvPr/>
+      </p:nvGrpSpPr>
+      <p:grpSpPr>
+        <a:xfrm>
+          <a:off x="0" y="0"/>
+          <a:ext cx="0" cy="0"/>
+          <a:chOff x="0" y="0"/>
+          <a:chExt cx="0" cy="0"/>
+        </a:xfrm>
+      </p:grpSpPr>
+      <p:sp>
+        <p:nvSpPr>
+          <p:cNvPr id="202" name="Google Shape;202;g2f49d5295ec_0_7:notes"/>
+          <p:cNvSpPr/>
+          <p:nvPr>
+            <p:ph idx="2" type="sldImg"/>
+          </p:nvPr>
+        </p:nvSpPr>
+        <p:spPr>
+          <a:xfrm>
+            <a:off x="381300" y="685800"/>
+            <a:ext cx="6096000" cy="3429000"/>
+          </a:xfrm>
+          <a:custGeom>
+            <a:rect b="b" l="l" r="r" t="t"/>
+            <a:pathLst>
+              <a:path extrusionOk="0" h="120000" w="120000">
+                <a:moveTo>
+                  <a:pt x="0" y="0"/>
+                </a:moveTo>
+                <a:lnTo>
+                  <a:pt x="120000" y="0"/>
+                </a:lnTo>
+                <a:lnTo>
+                  <a:pt x="120000" y="120000"/>
+                </a:lnTo>
+                <a:lnTo>
+                  <a:pt x="0" y="120000"/>
+                </a:lnTo>
+                <a:close/>
+              </a:path>
+            </a:pathLst>
+          </a:custGeom>
+        </p:spPr>
+      </p:sp>
+      <p:sp>
+        <p:nvSpPr>
+          <p:cNvPr id="203" name="Google Shape;203;g2f49d5295ec_0_7:notes"/>
+          <p:cNvSpPr txBox="1"/>
+          <p:nvPr>
+            <p:ph idx="1" type="body"/>
+          </p:nvPr>
+        </p:nvSpPr>
+        <p:spPr>
+          <a:xfrm>
+            <a:off x="685800" y="4343400"/>
+            <a:ext cx="5486400" cy="4114800"/>
+          </a:xfrm>
+          <a:prstGeom prst="rect">
+            <a:avLst/>
+          </a:prstGeom>
+        </p:spPr>
+        <p:txBody>
+          <a:bodyPr anchorCtr="0" anchor="t" bIns="91425" lIns="91425" spcFirstLastPara="1" rIns="91425" wrap="square" tIns="91425">
+            <a:noAutofit/>
+          </a:bodyPr>
+          <a:lstStyle/>
+          <a:p>
+            <a:pPr indent="0" lvl="0" marL="0" rtl="0" algn="l">
+              <a:spcBef>
+                <a:spcPts val="0"/>
+              </a:spcBef>
+              <a:spcAft>
+                <a:spcPts val="0"/>
+              </a:spcAft>
+              <a:buNone/>
+            </a:pPr>
+            <a:r>
+              <a:t/>
+            </a:r>
+            <a:endParaRPr/>
+          </a:p>
+        </p:txBody>
+      </p:sp>
+    </p:spTree>
+  </p:cSld>
+  <p:clrMapOvr>
+    <a:masterClrMapping/>
+  </p:clrMapOvr>
+</p:notes>
+</file>
+
+<file path=ppt/notesSlides/notesSlide5.xml><?xml version="1.0" encoding="utf-8"?>
+<p:notes xmlns:a="http://schemas.openxmlformats.org/drawingml/2006/main" xmlns:r="http://schemas.openxmlformats.org/officeDocument/2006/relationships" xmlns:mc="http://schemas.openxmlformats.org/markup-compatibility/2006" xmlns:mv="urn:schemas-microsoft-com:mac:vml" xmlns:p="http://schemas.openxmlformats.org/presentationml/2006/main" xmlns:c="http://schemas.openxmlformats.org/drawingml/2006/chart" xmlns:dgm="http://schemas.openxmlformats.org/drawingml/2006/diagram" xmlns:o="urn:schemas-microsoft-com:office:office" xmlns:v="urn:schemas-microsoft-com:vml" xmlns:pvml="urn:schemas-microsoft-com:office:powerpoint" xmlns:com="http://schemas.openxmlformats.org/drawingml/2006/compatibility" xmlns:p14="http://schemas.microsoft.com/office/powerpoint/2010/main" xmlns:p15="http://schemas.microsoft.com/office/powerpoint/2012/main" xmlns:ahyp="http://schemas.microsoft.com/office/drawing/2018/hyperlinkcolor" showMasterPhAnim="0" showMasterSp="0">
+  <p:cSld>
+    <p:spTree>
+      <p:nvGrpSpPr>
+        <p:cNvPr id="208" name="Shape 208"/>
+        <p:cNvGrpSpPr/>
+        <p:nvPr/>
+      </p:nvGrpSpPr>
+      <p:grpSpPr>
+        <a:xfrm>
+          <a:off x="0" y="0"/>
+          <a:ext cx="0" cy="0"/>
+          <a:chOff x="0" y="0"/>
+          <a:chExt cx="0" cy="0"/>
+        </a:xfrm>
+      </p:grpSpPr>
+      <p:sp>
+        <p:nvSpPr>
+          <p:cNvPr id="209" name="Google Shape;209;SLIDES_API672897434_33:notes"/>
+          <p:cNvSpPr/>
+          <p:nvPr>
+            <p:ph idx="2" type="sldImg"/>
+          </p:nvPr>
+        </p:nvSpPr>
+        <p:spPr>
+          <a:xfrm>
+            <a:off x="381300" y="685800"/>
+            <a:ext cx="6096000" cy="3429000"/>
+          </a:xfrm>
+          <a:custGeom>
+            <a:rect b="b" l="l" r="r" t="t"/>
+            <a:pathLst>
+              <a:path extrusionOk="0" h="120000" w="120000">
+                <a:moveTo>
+                  <a:pt x="0" y="0"/>
+                </a:moveTo>
+                <a:lnTo>
+                  <a:pt x="120000" y="0"/>
+                </a:lnTo>
+                <a:lnTo>
+                  <a:pt x="120000" y="120000"/>
+                </a:lnTo>
+                <a:lnTo>
+                  <a:pt x="0" y="120000"/>
+                </a:lnTo>
+                <a:close/>
+              </a:path>
+            </a:pathLst>
+          </a:custGeom>
+        </p:spPr>
+      </p:sp>
+      <p:sp>
+        <p:nvSpPr>
+          <p:cNvPr id="210" name="Google Shape;210;SLIDES_API672897434_33:notes"/>
           <p:cNvSpPr txBox="1"/>
           <p:nvPr>
             <p:ph idx="1" type="body"/>
@@ -1258,7 +1765,7 @@
       </p:grpSpPr>
       <p:sp>
         <p:nvSpPr>
-          <p:cNvPr id="218" name="Google Shape;218;SLIDES_API672897434_33:notes"/>
+          <p:cNvPr id="218" name="Google Shape;218;SLIDES_API672897434_21:notes"/>
           <p:cNvSpPr/>
           <p:nvPr>
             <p:ph idx="2" type="sldImg"/>
@@ -1293,7 +1800,7 @@
       </p:sp>
       <p:sp>
         <p:nvSpPr>
-          <p:cNvPr id="219" name="Google Shape;219;SLIDES_API672897434_33:notes"/>
+          <p:cNvPr id="219" name="Google Shape;219;SLIDES_API672897434_21:notes"/>
           <p:cNvSpPr txBox="1"/>
           <p:nvPr>
             <p:ph idx="1" type="body"/>
@@ -1343,7 +1850,7 @@
   <p:cSld>
     <p:spTree>
       <p:nvGrpSpPr>
-        <p:cNvPr id="226" name="Shape 226"/>
+        <p:cNvPr id="224" name="Shape 224"/>
         <p:cNvGrpSpPr/>
         <p:nvPr/>
       </p:nvGrpSpPr>
@@ -1357,7 +1864,7 @@
       </p:grpSpPr>
       <p:sp>
         <p:nvSpPr>
-          <p:cNvPr id="227" name="Google Shape;227;SLIDES_API672897434_41:notes"/>
+          <p:cNvPr id="225" name="Google Shape;225;SLIDES_API672897434_14:notes"/>
           <p:cNvSpPr/>
           <p:nvPr>
             <p:ph idx="2" type="sldImg"/>
@@ -1392,7 +1899,7 @@
       </p:sp>
       <p:sp>
         <p:nvSpPr>
-          <p:cNvPr id="228" name="Google Shape;228;SLIDES_API672897434_41:notes"/>
+          <p:cNvPr id="226" name="Google Shape;226;SLIDES_API672897434_14:notes"/>
           <p:cNvSpPr txBox="1"/>
           <p:nvPr>
             <p:ph idx="1" type="body"/>
@@ -1442,7 +1949,7 @@
   <p:cSld>
     <p:spTree>
       <p:nvGrpSpPr>
-        <p:cNvPr id="234" name="Shape 234"/>
+        <p:cNvPr id="232" name="Shape 232"/>
         <p:cNvGrpSpPr/>
         <p:nvPr/>
       </p:nvGrpSpPr>
@@ -1456,7 +1963,7 @@
       </p:grpSpPr>
       <p:sp>
         <p:nvSpPr>
-          <p:cNvPr id="235" name="Google Shape;235;SLIDES_API672897434_48:notes"/>
+          <p:cNvPr id="233" name="Google Shape;233;g2f49d5295ec_0_0:notes"/>
           <p:cNvSpPr/>
           <p:nvPr>
             <p:ph idx="2" type="sldImg"/>
@@ -1491,7 +1998,7 @@
       </p:sp>
       <p:sp>
         <p:nvSpPr>
-          <p:cNvPr id="236" name="Google Shape;236;SLIDES_API672897434_48:notes"/>
+          <p:cNvPr id="234" name="Google Shape;234;g2f49d5295ec_0_0:notes"/>
           <p:cNvSpPr txBox="1"/>
           <p:nvPr>
             <p:ph idx="1" type="body"/>
@@ -1541,7 +2048,7 @@
   <p:cSld>
     <p:spTree>
       <p:nvGrpSpPr>
-        <p:cNvPr id="244" name="Shape 244"/>
+        <p:cNvPr id="240" name="Shape 240"/>
         <p:cNvGrpSpPr/>
         <p:nvPr/>
       </p:nvGrpSpPr>
@@ -1555,7 +2062,7 @@
       </p:grpSpPr>
       <p:sp>
         <p:nvSpPr>
-          <p:cNvPr id="245" name="Google Shape;245;SLIDES_API672897434_57:notes"/>
+          <p:cNvPr id="241" name="Google Shape;241;g2f49d5295ec_0_21:notes"/>
           <p:cNvSpPr/>
           <p:nvPr>
             <p:ph idx="2" type="sldImg"/>
@@ -1590,7 +2097,7 @@
       </p:sp>
       <p:sp>
         <p:nvSpPr>
-          <p:cNvPr id="246" name="Google Shape;246;SLIDES_API672897434_57:notes"/>
+          <p:cNvPr id="242" name="Google Shape;242;g2f49d5295ec_0_21:notes"/>
           <p:cNvSpPr txBox="1"/>
           <p:nvPr>
             <p:ph idx="1" type="body"/>
@@ -19691,7 +20198,7 @@
                 <a:spcPts val="0"/>
               </a:spcBef>
               <a:spcAft>
-                <a:spcPts val="1200"/>
+                <a:spcPts val="0"/>
               </a:spcAft>
               <a:buNone/>
             </a:pPr>
@@ -19701,11 +20208,1001 @@
             </a:r>
             <a:endParaRPr/>
           </a:p>
+          <a:p>
+            <a:pPr indent="0" lvl="0" marL="0" rtl="0" algn="ctr">
+              <a:spcBef>
+                <a:spcPts val="1200"/>
+              </a:spcBef>
+              <a:spcAft>
+                <a:spcPts val="0"/>
+              </a:spcAft>
+              <a:buNone/>
+            </a:pPr>
+            <a:r>
+              <a:t/>
+            </a:r>
+            <a:endParaRPr b="1">
+              <a:latin typeface="Inter"/>
+              <a:ea typeface="Inter"/>
+              <a:cs typeface="Inter"/>
+              <a:sym typeface="Inter"/>
+            </a:endParaRPr>
+          </a:p>
+          <a:p>
+            <a:pPr indent="0" lvl="0" marL="0" rtl="0" algn="ctr">
+              <a:spcBef>
+                <a:spcPts val="1200"/>
+              </a:spcBef>
+              <a:spcAft>
+                <a:spcPts val="0"/>
+              </a:spcAft>
+              <a:buNone/>
+            </a:pPr>
+            <a:r>
+              <a:rPr b="1" lang="en">
+                <a:latin typeface="Inter"/>
+                <a:ea typeface="Inter"/>
+                <a:cs typeface="Inter"/>
+                <a:sym typeface="Inter"/>
+              </a:rPr>
+              <a:t>Presentation By</a:t>
+            </a:r>
+            <a:endParaRPr b="1">
+              <a:latin typeface="Inter"/>
+              <a:ea typeface="Inter"/>
+              <a:cs typeface="Inter"/>
+              <a:sym typeface="Inter"/>
+            </a:endParaRPr>
+          </a:p>
+          <a:p>
+            <a:pPr indent="0" lvl="0" marL="0" rtl="0" algn="ctr">
+              <a:spcBef>
+                <a:spcPts val="1200"/>
+              </a:spcBef>
+              <a:spcAft>
+                <a:spcPts val="1200"/>
+              </a:spcAft>
+              <a:buNone/>
+            </a:pPr>
+            <a:r>
+              <a:rPr b="1" lang="en">
+                <a:latin typeface="Inter"/>
+                <a:ea typeface="Inter"/>
+                <a:cs typeface="Inter"/>
+                <a:sym typeface="Inter"/>
+              </a:rPr>
+              <a:t>Calvine Dasilver, Christine Malinga, Ian Musau, Jacinta Chepkemoi, Tabitha Berum</a:t>
+            </a:r>
+            <a:endParaRPr b="1">
+              <a:latin typeface="Inter"/>
+              <a:ea typeface="Inter"/>
+              <a:cs typeface="Inter"/>
+              <a:sym typeface="Inter"/>
+            </a:endParaRPr>
+          </a:p>
         </p:txBody>
       </p:sp>
       <p:pic>
         <p:nvPicPr>
           <p:cNvPr id="185" name="Google Shape;185;p29"/>
+          <p:cNvPicPr preferRelativeResize="0"/>
+          <p:nvPr/>
+        </p:nvPicPr>
+        <p:blipFill>
+          <a:blip r:embed="rId3">
+            <a:alphaModFix/>
+          </a:blip>
+          <a:stretch>
+            <a:fillRect/>
+          </a:stretch>
+        </p:blipFill>
+        <p:spPr>
+          <a:xfrm>
+            <a:off x="7803976" y="0"/>
+            <a:ext cx="1340024" cy="550695"/>
+          </a:xfrm>
+          <a:prstGeom prst="rect">
+            <a:avLst/>
+          </a:prstGeom>
+          <a:noFill/>
+          <a:ln>
+            <a:noFill/>
+          </a:ln>
+        </p:spPr>
+      </p:pic>
+    </p:spTree>
+  </p:cSld>
+  <p:clrMapOvr>
+    <a:masterClrMapping/>
+  </p:clrMapOvr>
+</p:sld>
+</file>
+
+<file path=ppt/slides/slide10.xml><?xml version="1.0" encoding="utf-8"?>
+<p:sld xmlns:a="http://schemas.openxmlformats.org/drawingml/2006/main" xmlns:r="http://schemas.openxmlformats.org/officeDocument/2006/relationships" xmlns:mc="http://schemas.openxmlformats.org/markup-compatibility/2006" xmlns:mv="urn:schemas-microsoft-com:mac:vml" xmlns:p="http://schemas.openxmlformats.org/presentationml/2006/main" xmlns:c="http://schemas.openxmlformats.org/drawingml/2006/chart" xmlns:dgm="http://schemas.openxmlformats.org/drawingml/2006/diagram" xmlns:o="urn:schemas-microsoft-com:office:office" xmlns:v="urn:schemas-microsoft-com:vml" xmlns:pvml="urn:schemas-microsoft-com:office:powerpoint" xmlns:com="http://schemas.openxmlformats.org/drawingml/2006/compatibility" xmlns:p14="http://schemas.microsoft.com/office/powerpoint/2010/main" xmlns:p15="http://schemas.microsoft.com/office/powerpoint/2012/main" xmlns:ahyp="http://schemas.microsoft.com/office/drawing/2018/hyperlinkcolor">
+  <p:cSld>
+    <p:spTree>
+      <p:nvGrpSpPr>
+        <p:cNvPr id="251" name="Shape 251"/>
+        <p:cNvGrpSpPr/>
+        <p:nvPr/>
+      </p:nvGrpSpPr>
+      <p:grpSpPr>
+        <a:xfrm>
+          <a:off x="0" y="0"/>
+          <a:ext cx="0" cy="0"/>
+          <a:chOff x="0" y="0"/>
+          <a:chExt cx="0" cy="0"/>
+        </a:xfrm>
+      </p:grpSpPr>
+      <p:pic>
+        <p:nvPicPr>
+          <p:cNvPr id="252" name="Google Shape;252;p38"/>
+          <p:cNvPicPr preferRelativeResize="0"/>
+          <p:nvPr>
+            <p:ph idx="2" type="pic"/>
+          </p:nvPr>
+        </p:nvPicPr>
+        <p:blipFill rotWithShape="1">
+          <a:blip r:embed="rId3">
+            <a:alphaModFix/>
+          </a:blip>
+          <a:srcRect b="0" l="27711" r="27715" t="0"/>
+          <a:stretch/>
+        </p:blipFill>
+        <p:spPr>
+          <a:xfrm>
+            <a:off x="5711758" y="0"/>
+            <a:ext cx="3432300" cy="5143500"/>
+          </a:xfrm>
+          <a:prstGeom prst="roundRect">
+            <a:avLst>
+              <a:gd fmla="val 16667" name="adj"/>
+            </a:avLst>
+          </a:prstGeom>
+        </p:spPr>
+      </p:pic>
+      <p:sp>
+        <p:nvSpPr>
+          <p:cNvPr id="253" name="Google Shape;253;p38"/>
+          <p:cNvSpPr txBox="1"/>
+          <p:nvPr>
+            <p:ph type="title"/>
+          </p:nvPr>
+        </p:nvSpPr>
+        <p:spPr>
+          <a:xfrm>
+            <a:off x="632175" y="650250"/>
+            <a:ext cx="5046000" cy="726900"/>
+          </a:xfrm>
+          <a:prstGeom prst="rect">
+            <a:avLst/>
+          </a:prstGeom>
+        </p:spPr>
+        <p:txBody>
+          <a:bodyPr anchorCtr="0" anchor="ctr" bIns="91425" lIns="91425" spcFirstLastPara="1" rIns="91425" wrap="square" tIns="91425">
+            <a:noAutofit/>
+          </a:bodyPr>
+          <a:lstStyle/>
+          <a:p>
+            <a:pPr indent="0" lvl="0" marL="0" rtl="0" algn="l">
+              <a:spcBef>
+                <a:spcPts val="0"/>
+              </a:spcBef>
+              <a:spcAft>
+                <a:spcPts val="0"/>
+              </a:spcAft>
+              <a:buNone/>
+            </a:pPr>
+            <a:r>
+              <a:rPr lang="en"/>
+              <a:t>Models</a:t>
+            </a:r>
+            <a:endParaRPr/>
+          </a:p>
+        </p:txBody>
+      </p:sp>
+      <p:sp>
+        <p:nvSpPr>
+          <p:cNvPr id="254" name="Google Shape;254;p38"/>
+          <p:cNvSpPr txBox="1"/>
+          <p:nvPr>
+            <p:ph idx="1" type="subTitle"/>
+          </p:nvPr>
+        </p:nvSpPr>
+        <p:spPr>
+          <a:xfrm>
+            <a:off x="642700" y="1562500"/>
+            <a:ext cx="4337400" cy="1964700"/>
+          </a:xfrm>
+          <a:prstGeom prst="rect">
+            <a:avLst/>
+          </a:prstGeom>
+        </p:spPr>
+        <p:txBody>
+          <a:bodyPr anchorCtr="0" anchor="t" bIns="91425" lIns="91425" spcFirstLastPara="1" rIns="91425" wrap="square" tIns="91425">
+            <a:noAutofit/>
+          </a:bodyPr>
+          <a:lstStyle/>
+          <a:p>
+            <a:pPr indent="-311150" lvl="0" marL="457200" rtl="0" algn="l">
+              <a:lnSpc>
+                <a:spcPct val="110000"/>
+              </a:lnSpc>
+              <a:spcBef>
+                <a:spcPts val="0"/>
+              </a:spcBef>
+              <a:spcAft>
+                <a:spcPts val="0"/>
+              </a:spcAft>
+              <a:buSzPts val="1300"/>
+              <a:buChar char="●"/>
+            </a:pPr>
+            <a:r>
+              <a:rPr lang="en"/>
+              <a:t>Length of Stay: Random Forest Regression Model that explains 78% of the variance in the target variable</a:t>
+            </a:r>
+            <a:endParaRPr/>
+          </a:p>
+          <a:p>
+            <a:pPr indent="-311150" lvl="0" marL="457200" rtl="0" algn="l">
+              <a:lnSpc>
+                <a:spcPct val="110000"/>
+              </a:lnSpc>
+              <a:spcBef>
+                <a:spcPts val="0"/>
+              </a:spcBef>
+              <a:spcAft>
+                <a:spcPts val="0"/>
+              </a:spcAft>
+              <a:buSzPts val="1300"/>
+              <a:buChar char="●"/>
+            </a:pPr>
+            <a:r>
+              <a:rPr lang="en"/>
+              <a:t>Death Prediction: Logistic Regression Model with 98% classification accuracy</a:t>
+            </a:r>
+            <a:endParaRPr/>
+          </a:p>
+          <a:p>
+            <a:pPr indent="-311150" lvl="0" marL="457200" rtl="0" algn="l">
+              <a:lnSpc>
+                <a:spcPct val="110000"/>
+              </a:lnSpc>
+              <a:spcBef>
+                <a:spcPts val="0"/>
+              </a:spcBef>
+              <a:spcAft>
+                <a:spcPts val="0"/>
+              </a:spcAft>
+              <a:buSzPts val="1300"/>
+              <a:buChar char="●"/>
+            </a:pPr>
+            <a:r>
+              <a:rPr lang="en"/>
+              <a:t>Readmissions: Random Forest Classifier with 84% accuracy</a:t>
+            </a:r>
+            <a:endParaRPr/>
+          </a:p>
+        </p:txBody>
+      </p:sp>
+      <p:pic>
+        <p:nvPicPr>
+          <p:cNvPr id="255" name="Google Shape;255;p38"/>
+          <p:cNvPicPr preferRelativeResize="0"/>
+          <p:nvPr/>
+        </p:nvPicPr>
+        <p:blipFill>
+          <a:blip r:embed="rId4">
+            <a:alphaModFix/>
+          </a:blip>
+          <a:stretch>
+            <a:fillRect/>
+          </a:stretch>
+        </p:blipFill>
+        <p:spPr>
+          <a:xfrm>
+            <a:off x="7803976" y="0"/>
+            <a:ext cx="1340024" cy="550695"/>
+          </a:xfrm>
+          <a:prstGeom prst="rect">
+            <a:avLst/>
+          </a:prstGeom>
+          <a:noFill/>
+          <a:ln>
+            <a:noFill/>
+          </a:ln>
+        </p:spPr>
+      </p:pic>
+    </p:spTree>
+  </p:cSld>
+  <p:clrMapOvr>
+    <a:masterClrMapping/>
+  </p:clrMapOvr>
+</p:sld>
+</file>
+
+<file path=ppt/slides/slide11.xml><?xml version="1.0" encoding="utf-8"?>
+<p:sld xmlns:a="http://schemas.openxmlformats.org/drawingml/2006/main" xmlns:r="http://schemas.openxmlformats.org/officeDocument/2006/relationships" xmlns:mc="http://schemas.openxmlformats.org/markup-compatibility/2006" xmlns:mv="urn:schemas-microsoft-com:mac:vml" xmlns:p="http://schemas.openxmlformats.org/presentationml/2006/main" xmlns:c="http://schemas.openxmlformats.org/drawingml/2006/chart" xmlns:dgm="http://schemas.openxmlformats.org/drawingml/2006/diagram" xmlns:o="urn:schemas-microsoft-com:office:office" xmlns:v="urn:schemas-microsoft-com:vml" xmlns:pvml="urn:schemas-microsoft-com:office:powerpoint" xmlns:com="http://schemas.openxmlformats.org/drawingml/2006/compatibility" xmlns:p14="http://schemas.microsoft.com/office/powerpoint/2010/main" xmlns:p15="http://schemas.microsoft.com/office/powerpoint/2012/main" xmlns:ahyp="http://schemas.microsoft.com/office/drawing/2018/hyperlinkcolor">
+  <p:cSld>
+    <p:spTree>
+      <p:nvGrpSpPr>
+        <p:cNvPr id="259" name="Shape 259"/>
+        <p:cNvGrpSpPr/>
+        <p:nvPr/>
+      </p:nvGrpSpPr>
+      <p:grpSpPr>
+        <a:xfrm>
+          <a:off x="0" y="0"/>
+          <a:ext cx="0" cy="0"/>
+          <a:chOff x="0" y="0"/>
+          <a:chExt cx="0" cy="0"/>
+        </a:xfrm>
+      </p:grpSpPr>
+      <p:sp>
+        <p:nvSpPr>
+          <p:cNvPr id="260" name="Google Shape;260;p39"/>
+          <p:cNvSpPr txBox="1"/>
+          <p:nvPr>
+            <p:ph type="title"/>
+          </p:nvPr>
+        </p:nvSpPr>
+        <p:spPr>
+          <a:xfrm>
+            <a:off x="632175" y="550700"/>
+            <a:ext cx="5046000" cy="726900"/>
+          </a:xfrm>
+          <a:prstGeom prst="rect">
+            <a:avLst/>
+          </a:prstGeom>
+        </p:spPr>
+        <p:txBody>
+          <a:bodyPr anchorCtr="0" anchor="ctr" bIns="91425" lIns="91425" spcFirstLastPara="1" rIns="91425" wrap="square" tIns="91425">
+            <a:noAutofit/>
+          </a:bodyPr>
+          <a:lstStyle/>
+          <a:p>
+            <a:pPr indent="0" lvl="0" marL="0" rtl="0" algn="l">
+              <a:spcBef>
+                <a:spcPts val="0"/>
+              </a:spcBef>
+              <a:spcAft>
+                <a:spcPts val="0"/>
+              </a:spcAft>
+              <a:buNone/>
+            </a:pPr>
+            <a:r>
+              <a:rPr lang="en"/>
+              <a:t>Readmission Model</a:t>
+            </a:r>
+            <a:endParaRPr/>
+          </a:p>
+        </p:txBody>
+      </p:sp>
+      <p:pic>
+        <p:nvPicPr>
+          <p:cNvPr id="261" name="Google Shape;261;p39"/>
+          <p:cNvPicPr preferRelativeResize="0"/>
+          <p:nvPr/>
+        </p:nvPicPr>
+        <p:blipFill>
+          <a:blip r:embed="rId3">
+            <a:alphaModFix/>
+          </a:blip>
+          <a:stretch>
+            <a:fillRect/>
+          </a:stretch>
+        </p:blipFill>
+        <p:spPr>
+          <a:xfrm>
+            <a:off x="7803976" y="0"/>
+            <a:ext cx="1340024" cy="550695"/>
+          </a:xfrm>
+          <a:prstGeom prst="rect">
+            <a:avLst/>
+          </a:prstGeom>
+          <a:noFill/>
+          <a:ln>
+            <a:noFill/>
+          </a:ln>
+        </p:spPr>
+      </p:pic>
+      <p:pic>
+        <p:nvPicPr>
+          <p:cNvPr id="262" name="Google Shape;262;p39"/>
+          <p:cNvPicPr preferRelativeResize="0"/>
+          <p:nvPr/>
+        </p:nvPicPr>
+        <p:blipFill rotWithShape="1">
+          <a:blip r:embed="rId4">
+            <a:alphaModFix/>
+          </a:blip>
+          <a:srcRect b="5984" l="1170" r="1326" t="1516"/>
+          <a:stretch/>
+        </p:blipFill>
+        <p:spPr>
+          <a:xfrm>
+            <a:off x="214625" y="1147100"/>
+            <a:ext cx="5180501" cy="3996400"/>
+          </a:xfrm>
+          <a:prstGeom prst="rect">
+            <a:avLst/>
+          </a:prstGeom>
+          <a:noFill/>
+          <a:ln>
+            <a:noFill/>
+          </a:ln>
+        </p:spPr>
+      </p:pic>
+      <p:sp>
+        <p:nvSpPr>
+          <p:cNvPr id="263" name="Google Shape;263;p39"/>
+          <p:cNvSpPr txBox="1"/>
+          <p:nvPr/>
+        </p:nvSpPr>
+        <p:spPr>
+          <a:xfrm>
+            <a:off x="5609750" y="1568950"/>
+            <a:ext cx="3374700" cy="3422100"/>
+          </a:xfrm>
+          <a:prstGeom prst="rect">
+            <a:avLst/>
+          </a:prstGeom>
+          <a:noFill/>
+          <a:ln>
+            <a:noFill/>
+          </a:ln>
+        </p:spPr>
+        <p:txBody>
+          <a:bodyPr anchorCtr="0" anchor="t" bIns="91425" lIns="91425" spcFirstLastPara="1" rIns="91425" wrap="square" tIns="91425">
+            <a:noAutofit/>
+          </a:bodyPr>
+          <a:lstStyle/>
+          <a:p>
+            <a:pPr indent="0" lvl="0" marL="0" rtl="0" algn="l">
+              <a:spcBef>
+                <a:spcPts val="0"/>
+              </a:spcBef>
+              <a:spcAft>
+                <a:spcPts val="0"/>
+              </a:spcAft>
+              <a:buNone/>
+            </a:pPr>
+            <a:r>
+              <a:rPr lang="en" sz="1800">
+                <a:solidFill>
+                  <a:schemeClr val="dk2"/>
+                </a:solidFill>
+                <a:latin typeface="Inter Medium"/>
+                <a:ea typeface="Inter Medium"/>
+                <a:cs typeface="Inter Medium"/>
+                <a:sym typeface="Inter Medium"/>
+              </a:rPr>
+              <a:t>The readmission model shows good accuracy in predicting the variable. Despite the class imbalance, it is still able to predict both classes well.</a:t>
+            </a:r>
+            <a:endParaRPr sz="1800">
+              <a:solidFill>
+                <a:schemeClr val="dk2"/>
+              </a:solidFill>
+              <a:latin typeface="Inter Medium"/>
+              <a:ea typeface="Inter Medium"/>
+              <a:cs typeface="Inter Medium"/>
+              <a:sym typeface="Inter Medium"/>
+            </a:endParaRPr>
+          </a:p>
+        </p:txBody>
+      </p:sp>
+    </p:spTree>
+  </p:cSld>
+  <p:clrMapOvr>
+    <a:masterClrMapping/>
+  </p:clrMapOvr>
+</p:sld>
+</file>
+
+<file path=ppt/slides/slide12.xml><?xml version="1.0" encoding="utf-8"?>
+<p:sld xmlns:a="http://schemas.openxmlformats.org/drawingml/2006/main" xmlns:r="http://schemas.openxmlformats.org/officeDocument/2006/relationships" xmlns:mc="http://schemas.openxmlformats.org/markup-compatibility/2006" xmlns:mv="urn:schemas-microsoft-com:mac:vml" xmlns:p="http://schemas.openxmlformats.org/presentationml/2006/main" xmlns:c="http://schemas.openxmlformats.org/drawingml/2006/chart" xmlns:dgm="http://schemas.openxmlformats.org/drawingml/2006/diagram" xmlns:o="urn:schemas-microsoft-com:office:office" xmlns:v="urn:schemas-microsoft-com:vml" xmlns:pvml="urn:schemas-microsoft-com:office:powerpoint" xmlns:com="http://schemas.openxmlformats.org/drawingml/2006/compatibility" xmlns:p14="http://schemas.microsoft.com/office/powerpoint/2010/main" xmlns:p15="http://schemas.microsoft.com/office/powerpoint/2012/main" xmlns:ahyp="http://schemas.microsoft.com/office/drawing/2018/hyperlinkcolor">
+  <p:cSld>
+    <p:spTree>
+      <p:nvGrpSpPr>
+        <p:cNvPr id="267" name="Shape 267"/>
+        <p:cNvGrpSpPr/>
+        <p:nvPr/>
+      </p:nvGrpSpPr>
+      <p:grpSpPr>
+        <a:xfrm>
+          <a:off x="0" y="0"/>
+          <a:ext cx="0" cy="0"/>
+          <a:chOff x="0" y="0"/>
+          <a:chExt cx="0" cy="0"/>
+        </a:xfrm>
+      </p:grpSpPr>
+      <p:sp>
+        <p:nvSpPr>
+          <p:cNvPr id="268" name="Google Shape;268;p40"/>
+          <p:cNvSpPr txBox="1"/>
+          <p:nvPr>
+            <p:ph type="title"/>
+          </p:nvPr>
+        </p:nvSpPr>
+        <p:spPr>
+          <a:xfrm>
+            <a:off x="632175" y="550700"/>
+            <a:ext cx="5046000" cy="726900"/>
+          </a:xfrm>
+          <a:prstGeom prst="rect">
+            <a:avLst/>
+          </a:prstGeom>
+        </p:spPr>
+        <p:txBody>
+          <a:bodyPr anchorCtr="0" anchor="ctr" bIns="91425" lIns="91425" spcFirstLastPara="1" rIns="91425" wrap="square" tIns="91425">
+            <a:noAutofit/>
+          </a:bodyPr>
+          <a:lstStyle/>
+          <a:p>
+            <a:pPr indent="0" lvl="0" marL="0" rtl="0" algn="l">
+              <a:spcBef>
+                <a:spcPts val="0"/>
+              </a:spcBef>
+              <a:spcAft>
+                <a:spcPts val="0"/>
+              </a:spcAft>
+              <a:buNone/>
+            </a:pPr>
+            <a:r>
+              <a:rPr lang="en"/>
+              <a:t>Death</a:t>
+            </a:r>
+            <a:r>
+              <a:rPr lang="en"/>
+              <a:t> Model</a:t>
+            </a:r>
+            <a:endParaRPr/>
+          </a:p>
+        </p:txBody>
+      </p:sp>
+      <p:pic>
+        <p:nvPicPr>
+          <p:cNvPr id="269" name="Google Shape;269;p40"/>
+          <p:cNvPicPr preferRelativeResize="0"/>
+          <p:nvPr/>
+        </p:nvPicPr>
+        <p:blipFill>
+          <a:blip r:embed="rId3">
+            <a:alphaModFix/>
+          </a:blip>
+          <a:stretch>
+            <a:fillRect/>
+          </a:stretch>
+        </p:blipFill>
+        <p:spPr>
+          <a:xfrm>
+            <a:off x="7803976" y="0"/>
+            <a:ext cx="1340024" cy="550695"/>
+          </a:xfrm>
+          <a:prstGeom prst="rect">
+            <a:avLst/>
+          </a:prstGeom>
+          <a:noFill/>
+          <a:ln>
+            <a:noFill/>
+          </a:ln>
+        </p:spPr>
+      </p:pic>
+      <p:pic>
+        <p:nvPicPr>
+          <p:cNvPr id="270" name="Google Shape;270;p40"/>
+          <p:cNvPicPr preferRelativeResize="0"/>
+          <p:nvPr/>
+        </p:nvPicPr>
+        <p:blipFill rotWithShape="1">
+          <a:blip r:embed="rId4">
+            <a:alphaModFix/>
+          </a:blip>
+          <a:srcRect b="1300" l="1003" r="1597" t="1649"/>
+          <a:stretch/>
+        </p:blipFill>
+        <p:spPr>
+          <a:xfrm>
+            <a:off x="266425" y="1117500"/>
+            <a:ext cx="5046000" cy="4070400"/>
+          </a:xfrm>
+          <a:prstGeom prst="rect">
+            <a:avLst/>
+          </a:prstGeom>
+          <a:noFill/>
+          <a:ln>
+            <a:noFill/>
+          </a:ln>
+        </p:spPr>
+      </p:pic>
+      <p:sp>
+        <p:nvSpPr>
+          <p:cNvPr id="271" name="Google Shape;271;p40"/>
+          <p:cNvSpPr txBox="1"/>
+          <p:nvPr/>
+        </p:nvSpPr>
+        <p:spPr>
+          <a:xfrm>
+            <a:off x="5609750" y="1568950"/>
+            <a:ext cx="3374700" cy="3422100"/>
+          </a:xfrm>
+          <a:prstGeom prst="rect">
+            <a:avLst/>
+          </a:prstGeom>
+          <a:noFill/>
+          <a:ln>
+            <a:noFill/>
+          </a:ln>
+        </p:spPr>
+        <p:txBody>
+          <a:bodyPr anchorCtr="0" anchor="t" bIns="91425" lIns="91425" spcFirstLastPara="1" rIns="91425" wrap="square" tIns="91425">
+            <a:noAutofit/>
+          </a:bodyPr>
+          <a:lstStyle/>
+          <a:p>
+            <a:pPr indent="0" lvl="0" marL="0" rtl="0" algn="l">
+              <a:spcBef>
+                <a:spcPts val="0"/>
+              </a:spcBef>
+              <a:spcAft>
+                <a:spcPts val="0"/>
+              </a:spcAft>
+              <a:buNone/>
+            </a:pPr>
+            <a:r>
+              <a:rPr lang="en" sz="1800">
+                <a:solidFill>
+                  <a:schemeClr val="dk2"/>
+                </a:solidFill>
+                <a:latin typeface="Inter Medium"/>
+                <a:ea typeface="Inter Medium"/>
+                <a:cs typeface="Inter Medium"/>
+                <a:sym typeface="Inter Medium"/>
+              </a:rPr>
+              <a:t>The death model was very accurate in its predictions showing 97% accuracy. Even with the class imbalance of the True class, it still performs well in all classifications.</a:t>
+            </a:r>
+            <a:endParaRPr sz="1800">
+              <a:solidFill>
+                <a:schemeClr val="dk2"/>
+              </a:solidFill>
+              <a:latin typeface="Inter Medium"/>
+              <a:ea typeface="Inter Medium"/>
+              <a:cs typeface="Inter Medium"/>
+              <a:sym typeface="Inter Medium"/>
+            </a:endParaRPr>
+          </a:p>
+        </p:txBody>
+      </p:sp>
+    </p:spTree>
+  </p:cSld>
+  <p:clrMapOvr>
+    <a:masterClrMapping/>
+  </p:clrMapOvr>
+</p:sld>
+</file>
+
+<file path=ppt/slides/slide13.xml><?xml version="1.0" encoding="utf-8"?>
+<p:sld xmlns:a="http://schemas.openxmlformats.org/drawingml/2006/main" xmlns:r="http://schemas.openxmlformats.org/officeDocument/2006/relationships" xmlns:mc="http://schemas.openxmlformats.org/markup-compatibility/2006" xmlns:mv="urn:schemas-microsoft-com:mac:vml" xmlns:p="http://schemas.openxmlformats.org/presentationml/2006/main" xmlns:c="http://schemas.openxmlformats.org/drawingml/2006/chart" xmlns:dgm="http://schemas.openxmlformats.org/drawingml/2006/diagram" xmlns:o="urn:schemas-microsoft-com:office:office" xmlns:v="urn:schemas-microsoft-com:vml" xmlns:pvml="urn:schemas-microsoft-com:office:powerpoint" xmlns:com="http://schemas.openxmlformats.org/drawingml/2006/compatibility" xmlns:p14="http://schemas.microsoft.com/office/powerpoint/2010/main" xmlns:p15="http://schemas.microsoft.com/office/powerpoint/2012/main" xmlns:ahyp="http://schemas.microsoft.com/office/drawing/2018/hyperlinkcolor">
+  <p:cSld>
+    <p:spTree>
+      <p:nvGrpSpPr>
+        <p:cNvPr id="275" name="Shape 275"/>
+        <p:cNvGrpSpPr/>
+        <p:nvPr/>
+      </p:nvGrpSpPr>
+      <p:grpSpPr>
+        <a:xfrm>
+          <a:off x="0" y="0"/>
+          <a:ext cx="0" cy="0"/>
+          <a:chOff x="0" y="0"/>
+          <a:chExt cx="0" cy="0"/>
+        </a:xfrm>
+      </p:grpSpPr>
+      <p:sp>
+        <p:nvSpPr>
+          <p:cNvPr id="276" name="Google Shape;276;p41"/>
+          <p:cNvSpPr txBox="1"/>
+          <p:nvPr>
+            <p:ph idx="1" type="subTitle"/>
+          </p:nvPr>
+        </p:nvSpPr>
+        <p:spPr>
+          <a:xfrm>
+            <a:off x="467425" y="1394975"/>
+            <a:ext cx="2198400" cy="1216200"/>
+          </a:xfrm>
+          <a:prstGeom prst="rect">
+            <a:avLst/>
+          </a:prstGeom>
+        </p:spPr>
+        <p:txBody>
+          <a:bodyPr anchorCtr="0" anchor="t" bIns="91425" lIns="91425" spcFirstLastPara="1" rIns="91425" wrap="square" tIns="91425">
+            <a:noAutofit/>
+          </a:bodyPr>
+          <a:lstStyle/>
+          <a:p>
+            <a:pPr indent="0" lvl="0" marL="0" rtl="0" algn="r">
+              <a:spcBef>
+                <a:spcPts val="0"/>
+              </a:spcBef>
+              <a:spcAft>
+                <a:spcPts val="1200"/>
+              </a:spcAft>
+              <a:buNone/>
+            </a:pPr>
+            <a:r>
+              <a:rPr lang="en"/>
+              <a:t>The CHOP Model demonstrates the potential of predictive models in healthcare</a:t>
+            </a:r>
+            <a:endParaRPr/>
+          </a:p>
+        </p:txBody>
+      </p:sp>
+      <p:sp>
+        <p:nvSpPr>
+          <p:cNvPr id="277" name="Google Shape;277;p41"/>
+          <p:cNvSpPr txBox="1"/>
+          <p:nvPr>
+            <p:ph idx="2" type="subTitle"/>
+          </p:nvPr>
+        </p:nvSpPr>
+        <p:spPr>
+          <a:xfrm>
+            <a:off x="467425" y="3096425"/>
+            <a:ext cx="2198400" cy="1216200"/>
+          </a:xfrm>
+          <a:prstGeom prst="rect">
+            <a:avLst/>
+          </a:prstGeom>
+        </p:spPr>
+        <p:txBody>
+          <a:bodyPr anchorCtr="0" anchor="t" bIns="91425" lIns="91425" spcFirstLastPara="1" rIns="91425" wrap="square" tIns="91425">
+            <a:noAutofit/>
+          </a:bodyPr>
+          <a:lstStyle/>
+          <a:p>
+            <a:pPr indent="0" lvl="0" marL="0" rtl="0" algn="r">
+              <a:spcBef>
+                <a:spcPts val="0"/>
+              </a:spcBef>
+              <a:spcAft>
+                <a:spcPts val="1200"/>
+              </a:spcAft>
+              <a:buNone/>
+            </a:pPr>
+            <a:r>
+              <a:rPr lang="en"/>
+              <a:t>Improves patient outcomes and optimizes resource allocation</a:t>
+            </a:r>
+            <a:endParaRPr/>
+          </a:p>
+        </p:txBody>
+      </p:sp>
+      <p:sp>
+        <p:nvSpPr>
+          <p:cNvPr id="278" name="Google Shape;278;p41"/>
+          <p:cNvSpPr txBox="1"/>
+          <p:nvPr>
+            <p:ph idx="3" type="subTitle"/>
+          </p:nvPr>
+        </p:nvSpPr>
+        <p:spPr>
+          <a:xfrm>
+            <a:off x="6302925" y="1394975"/>
+            <a:ext cx="2277300" cy="1212300"/>
+          </a:xfrm>
+          <a:prstGeom prst="rect">
+            <a:avLst/>
+          </a:prstGeom>
+        </p:spPr>
+        <p:txBody>
+          <a:bodyPr anchorCtr="0" anchor="t" bIns="91425" lIns="91425" spcFirstLastPara="1" rIns="91425" wrap="square" tIns="91425">
+            <a:noAutofit/>
+          </a:bodyPr>
+          <a:lstStyle/>
+          <a:p>
+            <a:pPr indent="0" lvl="0" marL="0" rtl="0" algn="l">
+              <a:spcBef>
+                <a:spcPts val="0"/>
+              </a:spcBef>
+              <a:spcAft>
+                <a:spcPts val="1200"/>
+              </a:spcAft>
+              <a:buNone/>
+            </a:pPr>
+            <a:r>
+              <a:rPr lang="en"/>
+              <a:t>Historical data provides actionable insights for informed decision-making</a:t>
+            </a:r>
+            <a:endParaRPr/>
+          </a:p>
+        </p:txBody>
+      </p:sp>
+      <p:sp>
+        <p:nvSpPr>
+          <p:cNvPr id="279" name="Google Shape;279;p41"/>
+          <p:cNvSpPr txBox="1"/>
+          <p:nvPr>
+            <p:ph idx="4" type="subTitle"/>
+          </p:nvPr>
+        </p:nvSpPr>
+        <p:spPr>
+          <a:xfrm>
+            <a:off x="6302925" y="3096425"/>
+            <a:ext cx="2277300" cy="1212300"/>
+          </a:xfrm>
+          <a:prstGeom prst="rect">
+            <a:avLst/>
+          </a:prstGeom>
+        </p:spPr>
+        <p:txBody>
+          <a:bodyPr anchorCtr="0" anchor="t" bIns="91425" lIns="91425" spcFirstLastPara="1" rIns="91425" wrap="square" tIns="91425">
+            <a:noAutofit/>
+          </a:bodyPr>
+          <a:lstStyle/>
+          <a:p>
+            <a:pPr indent="0" lvl="0" marL="0" rtl="0" algn="l">
+              <a:spcBef>
+                <a:spcPts val="0"/>
+              </a:spcBef>
+              <a:spcAft>
+                <a:spcPts val="1200"/>
+              </a:spcAft>
+              <a:buNone/>
+            </a:pPr>
+            <a:r>
+              <a:rPr lang="en"/>
+              <a:t>CHOP </a:t>
+            </a:r>
+            <a:r>
+              <a:rPr lang="en"/>
+              <a:t>dashboard provides useful metrics for hospital administrators</a:t>
+            </a:r>
+            <a:endParaRPr/>
+          </a:p>
+        </p:txBody>
+      </p:sp>
+      <p:sp>
+        <p:nvSpPr>
+          <p:cNvPr id="280" name="Google Shape;280;p41"/>
+          <p:cNvSpPr txBox="1"/>
+          <p:nvPr>
+            <p:ph type="title"/>
+          </p:nvPr>
+        </p:nvSpPr>
+        <p:spPr>
+          <a:xfrm>
+            <a:off x="1245150" y="401725"/>
+            <a:ext cx="6653700" cy="423600"/>
+          </a:xfrm>
+          <a:prstGeom prst="rect">
+            <a:avLst/>
+          </a:prstGeom>
+        </p:spPr>
+        <p:txBody>
+          <a:bodyPr anchorCtr="0" anchor="ctr" bIns="91425" lIns="91425" spcFirstLastPara="1" rIns="91425" wrap="square" tIns="91425">
+            <a:noAutofit/>
+          </a:bodyPr>
+          <a:lstStyle/>
+          <a:p>
+            <a:pPr indent="0" lvl="0" marL="0" rtl="0" algn="ctr">
+              <a:spcBef>
+                <a:spcPts val="0"/>
+              </a:spcBef>
+              <a:spcAft>
+                <a:spcPts val="0"/>
+              </a:spcAft>
+              <a:buNone/>
+            </a:pPr>
+            <a:r>
+              <a:rPr lang="en"/>
+              <a:t>Conclusion</a:t>
+            </a:r>
+            <a:endParaRPr/>
+          </a:p>
+        </p:txBody>
+      </p:sp>
+      <p:pic>
+        <p:nvPicPr>
+          <p:cNvPr id="281" name="Google Shape;281;p41"/>
+          <p:cNvPicPr preferRelativeResize="0"/>
+          <p:nvPr/>
+        </p:nvPicPr>
+        <p:blipFill>
+          <a:blip r:embed="rId3">
+            <a:alphaModFix/>
+          </a:blip>
+          <a:stretch>
+            <a:fillRect/>
+          </a:stretch>
+        </p:blipFill>
+        <p:spPr>
+          <a:xfrm>
+            <a:off x="7803976" y="0"/>
+            <a:ext cx="1340024" cy="550695"/>
+          </a:xfrm>
+          <a:prstGeom prst="rect">
+            <a:avLst/>
+          </a:prstGeom>
+          <a:noFill/>
+          <a:ln>
+            <a:noFill/>
+          </a:ln>
+        </p:spPr>
+      </p:pic>
+    </p:spTree>
+  </p:cSld>
+  <p:clrMapOvr>
+    <a:masterClrMapping/>
+  </p:clrMapOvr>
+</p:sld>
+</file>
+
+<file path=ppt/slides/slide14.xml><?xml version="1.0" encoding="utf-8"?>
+<p:sld xmlns:a="http://schemas.openxmlformats.org/drawingml/2006/main" xmlns:r="http://schemas.openxmlformats.org/officeDocument/2006/relationships" xmlns:mc="http://schemas.openxmlformats.org/markup-compatibility/2006" xmlns:mv="urn:schemas-microsoft-com:mac:vml" xmlns:p="http://schemas.openxmlformats.org/presentationml/2006/main" xmlns:c="http://schemas.openxmlformats.org/drawingml/2006/chart" xmlns:dgm="http://schemas.openxmlformats.org/drawingml/2006/diagram" xmlns:o="urn:schemas-microsoft-com:office:office" xmlns:v="urn:schemas-microsoft-com:vml" xmlns:pvml="urn:schemas-microsoft-com:office:powerpoint" xmlns:com="http://schemas.openxmlformats.org/drawingml/2006/compatibility" xmlns:p14="http://schemas.microsoft.com/office/powerpoint/2010/main" xmlns:p15="http://schemas.microsoft.com/office/powerpoint/2012/main" xmlns:ahyp="http://schemas.microsoft.com/office/drawing/2018/hyperlinkcolor">
+  <p:cSld>
+    <p:spTree>
+      <p:nvGrpSpPr>
+        <p:cNvPr id="285" name="Shape 285"/>
+        <p:cNvGrpSpPr/>
+        <p:nvPr/>
+      </p:nvGrpSpPr>
+      <p:grpSpPr>
+        <a:xfrm>
+          <a:off x="0" y="0"/>
+          <a:ext cx="0" cy="0"/>
+          <a:chOff x="0" y="0"/>
+          <a:chExt cx="0" cy="0"/>
+        </a:xfrm>
+      </p:grpSpPr>
+      <p:sp>
+        <p:nvSpPr>
+          <p:cNvPr id="286" name="Google Shape;286;p42"/>
+          <p:cNvSpPr txBox="1"/>
+          <p:nvPr>
+            <p:ph type="title"/>
+          </p:nvPr>
+        </p:nvSpPr>
+        <p:spPr>
+          <a:xfrm>
+            <a:off x="530400" y="2208300"/>
+            <a:ext cx="8083200" cy="726900"/>
+          </a:xfrm>
+          <a:prstGeom prst="rect">
+            <a:avLst/>
+          </a:prstGeom>
+        </p:spPr>
+        <p:txBody>
+          <a:bodyPr anchorCtr="0" anchor="ctr" bIns="91425" lIns="91425" spcFirstLastPara="1" rIns="91425" wrap="square" tIns="91425">
+            <a:noAutofit/>
+          </a:bodyPr>
+          <a:lstStyle/>
+          <a:p>
+            <a:pPr indent="0" lvl="0" marL="0" rtl="0" algn="ctr">
+              <a:spcBef>
+                <a:spcPts val="0"/>
+              </a:spcBef>
+              <a:spcAft>
+                <a:spcPts val="0"/>
+              </a:spcAft>
+              <a:buNone/>
+            </a:pPr>
+            <a:r>
+              <a:rPr lang="en"/>
+              <a:t>Thank you for your </a:t>
+            </a:r>
+            <a:r>
+              <a:rPr lang="en"/>
+              <a:t>time</a:t>
+            </a:r>
+            <a:endParaRPr/>
+          </a:p>
+        </p:txBody>
+      </p:sp>
+      <p:pic>
+        <p:nvPicPr>
+          <p:cNvPr id="287" name="Google Shape;287;p42"/>
           <p:cNvPicPr preferRelativeResize="0"/>
           <p:nvPr/>
         </p:nvPicPr>
@@ -19761,53 +21258,13 @@
           <p:cNvPr id="190" name="Google Shape;190;p30"/>
           <p:cNvSpPr txBox="1"/>
           <p:nvPr>
-            <p:ph idx="1" type="subTitle"/>
-          </p:nvPr>
-        </p:nvSpPr>
-        <p:spPr>
-          <a:xfrm>
-            <a:off x="6595075" y="2305850"/>
-            <a:ext cx="2096100" cy="1360500"/>
-          </a:xfrm>
-          <a:prstGeom prst="rect">
-            <a:avLst/>
-          </a:prstGeom>
-        </p:spPr>
-        <p:txBody>
-          <a:bodyPr anchorCtr="0" anchor="t" bIns="91425" lIns="91425" spcFirstLastPara="1" rIns="91425" wrap="square" tIns="91425">
-            <a:noAutofit/>
-          </a:bodyPr>
-          <a:lstStyle/>
-          <a:p>
-            <a:pPr indent="0" lvl="0" marL="0" rtl="0" algn="l">
-              <a:spcBef>
-                <a:spcPts val="0"/>
-              </a:spcBef>
-              <a:spcAft>
-                <a:spcPts val="1200"/>
-              </a:spcAft>
-              <a:buNone/>
-            </a:pPr>
-            <a:r>
-              <a:rPr lang="en"/>
-              <a:t>Our vision is to help hospitals better plan and allocate resources</a:t>
-            </a:r>
-            <a:endParaRPr/>
-          </a:p>
-        </p:txBody>
-      </p:sp>
-      <p:sp>
-        <p:nvSpPr>
-          <p:cNvPr id="191" name="Google Shape;191;p30"/>
-          <p:cNvSpPr txBox="1"/>
-          <p:nvPr>
             <p:ph type="title"/>
           </p:nvPr>
         </p:nvSpPr>
         <p:spPr>
           <a:xfrm>
-            <a:off x="1730850" y="401725"/>
-            <a:ext cx="5682300" cy="423600"/>
+            <a:off x="732150" y="2208288"/>
+            <a:ext cx="7679700" cy="726900"/>
           </a:xfrm>
           <a:prstGeom prst="rect">
             <a:avLst/>
@@ -19830,87 +21287,7 @@
             </a:pPr>
             <a:r>
               <a:rPr lang="en"/>
-              <a:t>PITCH</a:t>
-            </a:r>
-            <a:endParaRPr/>
-          </a:p>
-        </p:txBody>
-      </p:sp>
-      <p:sp>
-        <p:nvSpPr>
-          <p:cNvPr id="192" name="Google Shape;192;p30"/>
-          <p:cNvSpPr txBox="1"/>
-          <p:nvPr>
-            <p:ph idx="2" type="subTitle"/>
-          </p:nvPr>
-        </p:nvSpPr>
-        <p:spPr>
-          <a:xfrm>
-            <a:off x="467425" y="1394975"/>
-            <a:ext cx="2198400" cy="822600"/>
-          </a:xfrm>
-          <a:prstGeom prst="rect">
-            <a:avLst/>
-          </a:prstGeom>
-        </p:spPr>
-        <p:txBody>
-          <a:bodyPr anchorCtr="0" anchor="t" bIns="91425" lIns="91425" spcFirstLastPara="1" rIns="91425" wrap="square" tIns="91425">
-            <a:noAutofit/>
-          </a:bodyPr>
-          <a:lstStyle/>
-          <a:p>
-            <a:pPr indent="0" lvl="0" marL="0" rtl="0" algn="r">
-              <a:spcBef>
-                <a:spcPts val="0"/>
-              </a:spcBef>
-              <a:spcAft>
-                <a:spcPts val="1200"/>
-              </a:spcAft>
-              <a:buNone/>
-            </a:pPr>
-            <a:r>
-              <a:rPr lang="en"/>
-              <a:t>In the medical sphere, predicting and allocating resources needed is a difficult task</a:t>
-            </a:r>
-            <a:endParaRPr/>
-          </a:p>
-        </p:txBody>
-      </p:sp>
-      <p:sp>
-        <p:nvSpPr>
-          <p:cNvPr id="193" name="Google Shape;193;p30"/>
-          <p:cNvSpPr txBox="1"/>
-          <p:nvPr>
-            <p:ph idx="3" type="subTitle"/>
-          </p:nvPr>
-        </p:nvSpPr>
-        <p:spPr>
-          <a:xfrm>
-            <a:off x="456700" y="3405075"/>
-            <a:ext cx="2361600" cy="885000"/>
-          </a:xfrm>
-          <a:prstGeom prst="rect">
-            <a:avLst/>
-          </a:prstGeom>
-        </p:spPr>
-        <p:txBody>
-          <a:bodyPr anchorCtr="0" anchor="t" bIns="91425" lIns="91425" spcFirstLastPara="1" rIns="91425" wrap="square" tIns="91425">
-            <a:noAutofit/>
-          </a:bodyPr>
-          <a:lstStyle/>
-          <a:p>
-            <a:pPr indent="0" lvl="0" marL="0" rtl="0" algn="r">
-              <a:spcBef>
-                <a:spcPts val="0"/>
-              </a:spcBef>
-              <a:spcAft>
-                <a:spcPts val="1200"/>
-              </a:spcAft>
-              <a:buNone/>
-            </a:pPr>
-            <a:r>
-              <a:rPr lang="en"/>
-              <a:t>By developing a model that predicts patient outcomes, hospitals can make more efficient resource allocation decisions</a:t>
+              <a:t>Project Overview</a:t>
             </a:r>
             <a:endParaRPr/>
           </a:p>
@@ -19918,7 +21295,7 @@
       </p:sp>
       <p:pic>
         <p:nvPicPr>
-          <p:cNvPr id="194" name="Google Shape;194;p30"/>
+          <p:cNvPr id="191" name="Google Shape;191;p30"/>
           <p:cNvPicPr preferRelativeResize="0"/>
           <p:nvPr/>
         </p:nvPicPr>
@@ -19957,7 +21334,7 @@
   <p:cSld>
     <p:spTree>
       <p:nvGrpSpPr>
-        <p:cNvPr id="198" name="Shape 198"/>
+        <p:cNvPr id="195" name="Shape 195"/>
         <p:cNvGrpSpPr/>
         <p:nvPr/>
       </p:nvGrpSpPr>
@@ -19969,36 +21346,49 @@
           <a:chExt cx="0" cy="0"/>
         </a:xfrm>
       </p:grpSpPr>
-      <p:pic>
-        <p:nvPicPr>
-          <p:cNvPr id="199" name="Google Shape;199;p31"/>
-          <p:cNvPicPr preferRelativeResize="0"/>
+      <p:sp>
+        <p:nvSpPr>
+          <p:cNvPr id="196" name="Google Shape;196;p31"/>
+          <p:cNvSpPr txBox="1"/>
           <p:nvPr>
-            <p:ph idx="2" type="pic"/>
+            <p:ph idx="1" type="subTitle"/>
           </p:nvPr>
-        </p:nvPicPr>
-        <p:blipFill rotWithShape="1">
-          <a:blip r:embed="rId3">
-            <a:alphaModFix/>
-          </a:blip>
-          <a:srcRect b="0" l="24973" r="24978" t="0"/>
-          <a:stretch/>
-        </p:blipFill>
+        </p:nvSpPr>
         <p:spPr>
           <a:xfrm>
-            <a:off x="5711758" y="0"/>
-            <a:ext cx="3432300" cy="5143500"/>
+            <a:off x="6595075" y="2305850"/>
+            <a:ext cx="2096100" cy="1360500"/>
           </a:xfrm>
-          <a:prstGeom prst="roundRect">
-            <a:avLst>
-              <a:gd fmla="val 16667" name="adj"/>
-            </a:avLst>
+          <a:prstGeom prst="rect">
+            <a:avLst/>
           </a:prstGeom>
         </p:spPr>
-      </p:pic>
+        <p:txBody>
+          <a:bodyPr anchorCtr="0" anchor="t" bIns="91425" lIns="91425" spcFirstLastPara="1" rIns="91425" wrap="square" tIns="91425">
+            <a:noAutofit/>
+          </a:bodyPr>
+          <a:lstStyle/>
+          <a:p>
+            <a:pPr indent="0" lvl="0" marL="0" rtl="0" algn="l">
+              <a:spcBef>
+                <a:spcPts val="0"/>
+              </a:spcBef>
+              <a:spcAft>
+                <a:spcPts val="1200"/>
+              </a:spcAft>
+              <a:buNone/>
+            </a:pPr>
+            <a:r>
+              <a:rPr lang="en"/>
+              <a:t>Our vision is to help hospitals better plan and allocate resources</a:t>
+            </a:r>
+            <a:endParaRPr/>
+          </a:p>
+        </p:txBody>
+      </p:sp>
       <p:sp>
         <p:nvSpPr>
-          <p:cNvPr id="200" name="Google Shape;200;p31"/>
+          <p:cNvPr id="197" name="Google Shape;197;p31"/>
           <p:cNvSpPr txBox="1"/>
           <p:nvPr>
             <p:ph type="title"/>
@@ -20006,8 +21396,8 @@
         </p:nvSpPr>
         <p:spPr>
           <a:xfrm>
-            <a:off x="632175" y="650250"/>
-            <a:ext cx="5046000" cy="726900"/>
+            <a:off x="1730850" y="401725"/>
+            <a:ext cx="5682300" cy="423600"/>
           </a:xfrm>
           <a:prstGeom prst="rect">
             <a:avLst/>
@@ -20019,7 +21409,7 @@
           </a:bodyPr>
           <a:lstStyle/>
           <a:p>
-            <a:pPr indent="0" lvl="0" marL="0" rtl="0" algn="l">
+            <a:pPr indent="0" lvl="0" marL="0" rtl="0" algn="ctr">
               <a:spcBef>
                 <a:spcPts val="0"/>
               </a:spcBef>
@@ -20030,7 +21420,7 @@
             </a:pPr>
             <a:r>
               <a:rPr lang="en"/>
-              <a:t>Proposed Solution</a:t>
+              <a:t>Problem Statement</a:t>
             </a:r>
             <a:endParaRPr/>
           </a:p>
@@ -20038,16 +21428,16 @@
       </p:sp>
       <p:sp>
         <p:nvSpPr>
-          <p:cNvPr id="201" name="Google Shape;201;p31"/>
+          <p:cNvPr id="198" name="Google Shape;198;p31"/>
           <p:cNvSpPr txBox="1"/>
           <p:nvPr>
-            <p:ph idx="1" type="subTitle"/>
+            <p:ph idx="2" type="subTitle"/>
           </p:nvPr>
         </p:nvSpPr>
         <p:spPr>
           <a:xfrm>
-            <a:off x="642700" y="1562500"/>
-            <a:ext cx="4337400" cy="1964700"/>
+            <a:off x="467425" y="1394975"/>
+            <a:ext cx="2198400" cy="822600"/>
           </a:xfrm>
           <a:prstGeom prst="rect">
             <a:avLst/>
@@ -20059,62 +21449,58 @@
           </a:bodyPr>
           <a:lstStyle/>
           <a:p>
-            <a:pPr indent="-311150" lvl="0" marL="457200" rtl="0" algn="l">
-              <a:lnSpc>
-                <a:spcPct val="110000"/>
-              </a:lnSpc>
-              <a:spcBef>
-                <a:spcPts val="0"/>
-              </a:spcBef>
-              <a:spcAft>
-                <a:spcPts val="0"/>
-              </a:spcAft>
-              <a:buSzPts val="1300"/>
-              <a:buChar char="●"/>
+            <a:pPr indent="0" lvl="0" marL="0" rtl="0" algn="r">
+              <a:spcBef>
+                <a:spcPts val="0"/>
+              </a:spcBef>
+              <a:spcAft>
+                <a:spcPts val="1200"/>
+              </a:spcAft>
+              <a:buNone/>
             </a:pPr>
             <a:r>
               <a:rPr lang="en"/>
-              <a:t>Develop a model that can predict aspects of patient stay, including duration and risk of death</a:t>
+              <a:t>In the medical sphere, predicting and allocating resources needed is a difficult task</a:t>
             </a:r>
             <a:endParaRPr/>
           </a:p>
+        </p:txBody>
+      </p:sp>
+      <p:sp>
+        <p:nvSpPr>
+          <p:cNvPr id="199" name="Google Shape;199;p31"/>
+          <p:cNvSpPr txBox="1"/>
+          <p:nvPr>
+            <p:ph idx="3" type="subTitle"/>
+          </p:nvPr>
+        </p:nvSpPr>
+        <p:spPr>
+          <a:xfrm>
+            <a:off x="456700" y="3405075"/>
+            <a:ext cx="2361600" cy="885000"/>
+          </a:xfrm>
+          <a:prstGeom prst="rect">
+            <a:avLst/>
+          </a:prstGeom>
+        </p:spPr>
+        <p:txBody>
+          <a:bodyPr anchorCtr="0" anchor="t" bIns="91425" lIns="91425" spcFirstLastPara="1" rIns="91425" wrap="square" tIns="91425">
+            <a:noAutofit/>
+          </a:bodyPr>
+          <a:lstStyle/>
           <a:p>
-            <a:pPr indent="-311150" lvl="0" marL="457200" rtl="0" algn="l">
-              <a:lnSpc>
-                <a:spcPct val="110000"/>
-              </a:lnSpc>
-              <a:spcBef>
-                <a:spcPts val="0"/>
-              </a:spcBef>
-              <a:spcAft>
-                <a:spcPts val="0"/>
-              </a:spcAft>
-              <a:buSzPts val="1300"/>
-              <a:buChar char="●"/>
+            <a:pPr indent="0" lvl="0" marL="0" rtl="0" algn="r">
+              <a:spcBef>
+                <a:spcPts val="0"/>
+              </a:spcBef>
+              <a:spcAft>
+                <a:spcPts val="1200"/>
+              </a:spcAft>
+              <a:buNone/>
             </a:pPr>
             <a:r>
               <a:rPr lang="en"/>
-              <a:t>By having a better understanding of patient needs, hospitals can plan for resource allocation</a:t>
-            </a:r>
-            <a:endParaRPr/>
-          </a:p>
-          <a:p>
-            <a:pPr indent="-311150" lvl="0" marL="457200" rtl="0" algn="l">
-              <a:lnSpc>
-                <a:spcPct val="110000"/>
-              </a:lnSpc>
-              <a:spcBef>
-                <a:spcPts val="0"/>
-              </a:spcBef>
-              <a:spcAft>
-                <a:spcPts val="0"/>
-              </a:spcAft>
-              <a:buSzPts val="1300"/>
-              <a:buChar char="●"/>
-            </a:pPr>
-            <a:r>
-              <a:rPr lang="en"/>
-              <a:t>This model will leverage patient information to make accurate predictions</a:t>
+              <a:t>By developing a model that predicts patient outcomes, hospitals can make more efficient resource allocation decisions</a:t>
             </a:r>
             <a:endParaRPr/>
           </a:p>
@@ -20122,12 +21508,12 @@
       </p:sp>
       <p:pic>
         <p:nvPicPr>
-          <p:cNvPr id="202" name="Google Shape;202;p31"/>
+          <p:cNvPr id="200" name="Google Shape;200;p31"/>
           <p:cNvPicPr preferRelativeResize="0"/>
           <p:nvPr/>
         </p:nvPicPr>
         <p:blipFill>
-          <a:blip r:embed="rId4">
+          <a:blip r:embed="rId3">
             <a:alphaModFix/>
           </a:blip>
           <a:stretch>
@@ -20161,7 +21547,7 @@
   <p:cSld>
     <p:spTree>
       <p:nvGrpSpPr>
-        <p:cNvPr id="206" name="Shape 206"/>
+        <p:cNvPr id="204" name="Shape 204"/>
         <p:cNvGrpSpPr/>
         <p:nvPr/>
       </p:nvGrpSpPr>
@@ -20175,7 +21561,7 @@
       </p:grpSpPr>
       <p:sp>
         <p:nvSpPr>
-          <p:cNvPr id="207" name="Google Shape;207;p32"/>
+          <p:cNvPr id="205" name="Google Shape;205;p32"/>
           <p:cNvSpPr txBox="1"/>
           <p:nvPr>
             <p:ph idx="1" type="subTitle"/>
@@ -20184,7 +21570,7 @@
         <p:spPr>
           <a:xfrm>
             <a:off x="383075" y="1631475"/>
-            <a:ext cx="7753500" cy="407400"/>
+            <a:ext cx="7753500" cy="751500"/>
           </a:xfrm>
           <a:prstGeom prst="rect">
             <a:avLst/>
@@ -20196,6 +21582,77 @@
           </a:bodyPr>
           <a:lstStyle/>
           <a:p>
+            <a:pPr indent="0" lvl="0" marL="0" rtl="0" algn="l">
+              <a:lnSpc>
+                <a:spcPct val="110000"/>
+              </a:lnSpc>
+              <a:spcBef>
+                <a:spcPts val="0"/>
+              </a:spcBef>
+              <a:spcAft>
+                <a:spcPts val="0"/>
+              </a:spcAft>
+              <a:buNone/>
+            </a:pPr>
+            <a:r>
+              <a:rPr lang="en"/>
+              <a:t>Develop Predictive Models capable of accurately predicting patient outcomes. Outcomes predicted will be length of stay, chance of readmission and risk of death. This will be provided through an analytics dashboard and a callable API.</a:t>
+            </a:r>
+            <a:endParaRPr/>
+          </a:p>
+          <a:p>
+            <a:pPr indent="0" lvl="0" marL="0" rtl="0" algn="l">
+              <a:lnSpc>
+                <a:spcPct val="100000"/>
+              </a:lnSpc>
+              <a:spcBef>
+                <a:spcPts val="1200"/>
+              </a:spcBef>
+              <a:spcAft>
+                <a:spcPts val="0"/>
+              </a:spcAft>
+              <a:buNone/>
+            </a:pPr>
+            <a:r>
+              <a:rPr b="1" lang="en" sz="2400">
+                <a:latin typeface="Space Grotesk"/>
+                <a:ea typeface="Space Grotesk"/>
+                <a:cs typeface="Space Grotesk"/>
+                <a:sym typeface="Space Grotesk"/>
+              </a:rPr>
+              <a:t>Sub Objectives</a:t>
+            </a:r>
+            <a:endParaRPr b="1" sz="2400">
+              <a:latin typeface="Space Grotesk"/>
+              <a:ea typeface="Space Grotesk"/>
+              <a:cs typeface="Space Grotesk"/>
+              <a:sym typeface="Space Grotesk"/>
+            </a:endParaRPr>
+          </a:p>
+          <a:p>
+            <a:pPr indent="0" lvl="0" marL="0" rtl="0" algn="l">
+              <a:lnSpc>
+                <a:spcPct val="100000"/>
+              </a:lnSpc>
+              <a:spcBef>
+                <a:spcPts val="0"/>
+              </a:spcBef>
+              <a:spcAft>
+                <a:spcPts val="0"/>
+              </a:spcAft>
+              <a:buNone/>
+            </a:pPr>
+            <a:r>
+              <a:t/>
+            </a:r>
+            <a:endParaRPr b="1" sz="2400">
+              <a:latin typeface="Space Grotesk"/>
+              <a:ea typeface="Space Grotesk"/>
+              <a:cs typeface="Space Grotesk"/>
+              <a:sym typeface="Space Grotesk"/>
+            </a:endParaRPr>
+          </a:p>
+          <a:p>
             <a:pPr indent="-304800" lvl="0" marL="457200" rtl="0" algn="l">
               <a:lnSpc>
                 <a:spcPct val="110000"/>
@@ -20211,7 +21668,7 @@
             </a:pPr>
             <a:r>
               <a:rPr lang="en"/>
-              <a:t>Python</a:t>
+              <a:t>Dummy Hospital: Create a fake hospital with room, patient, and staff records</a:t>
             </a:r>
             <a:endParaRPr/>
           </a:p>
@@ -20231,7 +21688,7 @@
             </a:pPr>
             <a:r>
               <a:rPr lang="en"/>
-              <a:t>Pandas</a:t>
+              <a:t>Data preparation: Extract and join relevant information from multiple CSV files</a:t>
             </a:r>
             <a:endParaRPr/>
           </a:p>
@@ -20251,7 +21708,7 @@
             </a:pPr>
             <a:r>
               <a:rPr lang="en"/>
-              <a:t>Scikit-learn</a:t>
+              <a:t>Model Accuracy: Set a baseline of 80% for a successful model</a:t>
             </a:r>
             <a:endParaRPr/>
           </a:p>
@@ -20271,7 +21728,7 @@
             </a:pPr>
             <a:r>
               <a:rPr lang="en"/>
-              <a:t>Numpy</a:t>
+              <a:t>Hospital Management System: Create a management suite for patient and staff management</a:t>
             </a:r>
             <a:endParaRPr/>
           </a:p>
@@ -20291,87 +21748,7 @@
             </a:pPr>
             <a:r>
               <a:rPr lang="en"/>
-              <a:t>Seaborn</a:t>
-            </a:r>
-            <a:endParaRPr/>
-          </a:p>
-          <a:p>
-            <a:pPr indent="-304800" lvl="0" marL="457200" rtl="0" algn="l">
-              <a:lnSpc>
-                <a:spcPct val="110000"/>
-              </a:lnSpc>
-              <a:spcBef>
-                <a:spcPts val="0"/>
-              </a:spcBef>
-              <a:spcAft>
-                <a:spcPts val="0"/>
-              </a:spcAft>
-              <a:buSzPts val="1200"/>
-              <a:buChar char="●"/>
-            </a:pPr>
-            <a:r>
-              <a:rPr lang="en"/>
-              <a:t>Matplotlib</a:t>
-            </a:r>
-            <a:endParaRPr/>
-          </a:p>
-          <a:p>
-            <a:pPr indent="-304800" lvl="0" marL="457200" rtl="0" algn="l">
-              <a:lnSpc>
-                <a:spcPct val="110000"/>
-              </a:lnSpc>
-              <a:spcBef>
-                <a:spcPts val="0"/>
-              </a:spcBef>
-              <a:spcAft>
-                <a:spcPts val="0"/>
-              </a:spcAft>
-              <a:buSzPts val="1200"/>
-              <a:buChar char="●"/>
-            </a:pPr>
-            <a:r>
-              <a:rPr lang="en"/>
-              <a:t>FastAPI</a:t>
-            </a:r>
-            <a:endParaRPr/>
-          </a:p>
-          <a:p>
-            <a:pPr indent="-304800" lvl="0" marL="457200" rtl="0" algn="l">
-              <a:lnSpc>
-                <a:spcPct val="110000"/>
-              </a:lnSpc>
-              <a:spcBef>
-                <a:spcPts val="0"/>
-              </a:spcBef>
-              <a:spcAft>
-                <a:spcPts val="0"/>
-              </a:spcAft>
-              <a:buSzPts val="1200"/>
-              <a:buChar char="●"/>
-            </a:pPr>
-            <a:r>
-              <a:rPr lang="en"/>
-              <a:t>Uvicorn</a:t>
-            </a:r>
-            <a:endParaRPr/>
-          </a:p>
-          <a:p>
-            <a:pPr indent="-304800" lvl="0" marL="457200" rtl="0" algn="l">
-              <a:lnSpc>
-                <a:spcPct val="110000"/>
-              </a:lnSpc>
-              <a:spcBef>
-                <a:spcPts val="0"/>
-              </a:spcBef>
-              <a:spcAft>
-                <a:spcPts val="0"/>
-              </a:spcAft>
-              <a:buSzPts val="1200"/>
-              <a:buChar char="●"/>
-            </a:pPr>
-            <a:r>
-              <a:rPr lang="en"/>
-              <a:t>W3 HTML Elements</a:t>
+              <a:t>Deploy Model: Integrate the model into the management software</a:t>
             </a:r>
             <a:endParaRPr/>
           </a:p>
@@ -20379,7 +21756,7 @@
       </p:sp>
       <p:sp>
         <p:nvSpPr>
-          <p:cNvPr id="208" name="Google Shape;208;p32"/>
+          <p:cNvPr id="206" name="Google Shape;206;p32"/>
           <p:cNvSpPr txBox="1"/>
           <p:nvPr>
             <p:ph type="title"/>
@@ -20411,7 +21788,11 @@
             </a:pPr>
             <a:r>
               <a:rPr lang="en"/>
-              <a:t>Technologies Used</a:t>
+              <a:t>Main </a:t>
+            </a:r>
+            <a:r>
+              <a:rPr lang="en"/>
+              <a:t>Objective</a:t>
             </a:r>
             <a:endParaRPr/>
           </a:p>
@@ -20419,7 +21800,7 @@
       </p:sp>
       <p:pic>
         <p:nvPicPr>
-          <p:cNvPr id="209" name="Google Shape;209;p32"/>
+          <p:cNvPr id="207" name="Google Shape;207;p32"/>
           <p:cNvPicPr preferRelativeResize="0"/>
           <p:nvPr/>
         </p:nvPicPr>
@@ -20458,7 +21839,7 @@
   <p:cSld>
     <p:spTree>
       <p:nvGrpSpPr>
-        <p:cNvPr id="213" name="Shape 213"/>
+        <p:cNvPr id="211" name="Shape 211"/>
         <p:cNvGrpSpPr/>
         <p:nvPr/>
       </p:nvGrpSpPr>
@@ -20470,153 +21851,36 @@
           <a:chExt cx="0" cy="0"/>
         </a:xfrm>
       </p:grpSpPr>
+      <p:pic>
+        <p:nvPicPr>
+          <p:cNvPr id="212" name="Google Shape;212;p33"/>
+          <p:cNvPicPr preferRelativeResize="0"/>
+          <p:nvPr>
+            <p:ph idx="2" type="pic"/>
+          </p:nvPr>
+        </p:nvPicPr>
+        <p:blipFill rotWithShape="1">
+          <a:blip r:embed="rId3">
+            <a:alphaModFix/>
+          </a:blip>
+          <a:srcRect b="0" l="27736" r="27741" t="0"/>
+          <a:stretch/>
+        </p:blipFill>
+        <p:spPr>
+          <a:xfrm>
+            <a:off x="0" y="0"/>
+            <a:ext cx="3432300" cy="5143500"/>
+          </a:xfrm>
+          <a:prstGeom prst="roundRect">
+            <a:avLst>
+              <a:gd fmla="val 16667" name="adj"/>
+            </a:avLst>
+          </a:prstGeom>
+        </p:spPr>
+      </p:pic>
       <p:sp>
         <p:nvSpPr>
-          <p:cNvPr id="214" name="Google Shape;214;p33"/>
-          <p:cNvSpPr txBox="1"/>
-          <p:nvPr>
-            <p:ph idx="1" type="subTitle"/>
-          </p:nvPr>
-        </p:nvSpPr>
-        <p:spPr>
-          <a:xfrm>
-            <a:off x="383075" y="1631475"/>
-            <a:ext cx="7753500" cy="407400"/>
-          </a:xfrm>
-          <a:prstGeom prst="rect">
-            <a:avLst/>
-          </a:prstGeom>
-        </p:spPr>
-        <p:txBody>
-          <a:bodyPr anchorCtr="0" anchor="t" bIns="91425" lIns="91425" spcFirstLastPara="1" rIns="91425" wrap="square" tIns="91425">
-            <a:noAutofit/>
-          </a:bodyPr>
-          <a:lstStyle/>
-          <a:p>
-            <a:pPr indent="-304800" lvl="0" marL="457200" rtl="0" algn="l">
-              <a:lnSpc>
-                <a:spcPct val="110000"/>
-              </a:lnSpc>
-              <a:spcBef>
-                <a:spcPts val="0"/>
-              </a:spcBef>
-              <a:spcAft>
-                <a:spcPts val="0"/>
-              </a:spcAft>
-              <a:buSzPts val="1200"/>
-              <a:buChar char="●"/>
-            </a:pPr>
-            <a:r>
-              <a:rPr lang="en"/>
-              <a:t>Dummy Hospital: Create a fake hospital with room, patient, and staff records</a:t>
-            </a:r>
-            <a:endParaRPr/>
-          </a:p>
-          <a:p>
-            <a:pPr indent="-304800" lvl="0" marL="457200" rtl="0" algn="l">
-              <a:lnSpc>
-                <a:spcPct val="110000"/>
-              </a:lnSpc>
-              <a:spcBef>
-                <a:spcPts val="0"/>
-              </a:spcBef>
-              <a:spcAft>
-                <a:spcPts val="0"/>
-              </a:spcAft>
-              <a:buSzPts val="1200"/>
-              <a:buChar char="●"/>
-            </a:pPr>
-            <a:r>
-              <a:rPr lang="en"/>
-              <a:t>Data preparation: Extract and join relevant information from multiple CSV files</a:t>
-            </a:r>
-            <a:endParaRPr/>
-          </a:p>
-          <a:p>
-            <a:pPr indent="-304800" lvl="0" marL="457200" rtl="0" algn="l">
-              <a:lnSpc>
-                <a:spcPct val="110000"/>
-              </a:lnSpc>
-              <a:spcBef>
-                <a:spcPts val="0"/>
-              </a:spcBef>
-              <a:spcAft>
-                <a:spcPts val="0"/>
-              </a:spcAft>
-              <a:buSzPts val="1200"/>
-              <a:buChar char="●"/>
-            </a:pPr>
-            <a:r>
-              <a:rPr lang="en"/>
-              <a:t>Develop a Predictive Model: Create a model capable of accurately predicting patient outcomes</a:t>
-            </a:r>
-            <a:endParaRPr/>
-          </a:p>
-          <a:p>
-            <a:pPr indent="-304800" lvl="0" marL="457200" rtl="0" algn="l">
-              <a:lnSpc>
-                <a:spcPct val="110000"/>
-              </a:lnSpc>
-              <a:spcBef>
-                <a:spcPts val="0"/>
-              </a:spcBef>
-              <a:spcAft>
-                <a:spcPts val="0"/>
-              </a:spcAft>
-              <a:buSzPts val="1200"/>
-              <a:buChar char="●"/>
-            </a:pPr>
-            <a:r>
-              <a:rPr lang="en"/>
-              <a:t>Model Accuracy: Set a baseline of 80% for a successful model</a:t>
-            </a:r>
-            <a:endParaRPr/>
-          </a:p>
-          <a:p>
-            <a:pPr indent="-304800" lvl="0" marL="457200" rtl="0" algn="l">
-              <a:lnSpc>
-                <a:spcPct val="110000"/>
-              </a:lnSpc>
-              <a:spcBef>
-                <a:spcPts val="0"/>
-              </a:spcBef>
-              <a:spcAft>
-                <a:spcPts val="0"/>
-              </a:spcAft>
-              <a:buSzPts val="1200"/>
-              <a:buChar char="●"/>
-            </a:pPr>
-            <a:r>
-              <a:rPr lang="en"/>
-              <a:t>Hospital Management System: Create a management suite for patient and staff management</a:t>
-            </a:r>
-            <a:endParaRPr/>
-          </a:p>
-          <a:p>
-            <a:pPr indent="-304800" lvl="0" marL="457200" rtl="0" algn="l">
-              <a:lnSpc>
-                <a:spcPct val="110000"/>
-              </a:lnSpc>
-              <a:spcBef>
-                <a:spcPts val="0"/>
-              </a:spcBef>
-              <a:spcAft>
-                <a:spcPts val="0"/>
-              </a:spcAft>
-              <a:buSzPts val="1200"/>
-              <a:buChar char="●"/>
-            </a:pPr>
-            <a:r>
-              <a:rPr lang="en"/>
-              <a:t>Deploy Model: Integrate the model into the management software</a:t>
-            </a:r>
-            <a:endParaRPr/>
-          </a:p>
-        </p:txBody>
-      </p:sp>
-      <p:sp>
-        <p:nvSpPr>
-          <p:cNvPr id="215" name="Google Shape;215;p33"/>
+          <p:cNvPr id="213" name="Google Shape;213;p33"/>
           <p:cNvSpPr txBox="1"/>
           <p:nvPr>
             <p:ph type="title"/>
@@ -20624,8 +21888,8 @@
         </p:nvSpPr>
         <p:spPr>
           <a:xfrm>
-            <a:off x="383075" y="900950"/>
-            <a:ext cx="7753500" cy="636000"/>
+            <a:off x="4135200" y="650250"/>
+            <a:ext cx="4270500" cy="726900"/>
           </a:xfrm>
           <a:prstGeom prst="rect">
             <a:avLst/>
@@ -20648,7 +21912,91 @@
             </a:pPr>
             <a:r>
               <a:rPr lang="en"/>
-              <a:t>Objectives</a:t>
+              <a:t>Data Sources</a:t>
+            </a:r>
+            <a:endParaRPr/>
+          </a:p>
+        </p:txBody>
+      </p:sp>
+      <p:sp>
+        <p:nvSpPr>
+          <p:cNvPr id="214" name="Google Shape;214;p33"/>
+          <p:cNvSpPr txBox="1"/>
+          <p:nvPr>
+            <p:ph idx="1" type="subTitle"/>
+          </p:nvPr>
+        </p:nvSpPr>
+        <p:spPr>
+          <a:xfrm>
+            <a:off x="4678425" y="1687125"/>
+            <a:ext cx="3727200" cy="934800"/>
+          </a:xfrm>
+          <a:prstGeom prst="rect">
+            <a:avLst/>
+          </a:prstGeom>
+        </p:spPr>
+        <p:txBody>
+          <a:bodyPr anchorCtr="0" anchor="t" bIns="91425" lIns="91425" spcFirstLastPara="1" rIns="91425" wrap="square" tIns="91425">
+            <a:noAutofit/>
+          </a:bodyPr>
+          <a:lstStyle/>
+          <a:p>
+            <a:pPr indent="0" lvl="0" marL="0" rtl="0" algn="l">
+              <a:spcBef>
+                <a:spcPts val="0"/>
+              </a:spcBef>
+              <a:spcAft>
+                <a:spcPts val="1200"/>
+              </a:spcAft>
+              <a:buNone/>
+            </a:pPr>
+            <a:r>
+              <a:rPr lang="en"/>
+              <a:t>MIMIC-IV Clinical Database: Provides comprehensive clinical information on patients</a:t>
+            </a:r>
+            <a:endParaRPr/>
+          </a:p>
+        </p:txBody>
+      </p:sp>
+      <p:sp>
+        <p:nvSpPr>
+          <p:cNvPr id="215" name="Google Shape;215;p33"/>
+          <p:cNvSpPr txBox="1"/>
+          <p:nvPr>
+            <p:ph idx="3" type="subTitle"/>
+          </p:nvPr>
+        </p:nvSpPr>
+        <p:spPr>
+          <a:xfrm>
+            <a:off x="4678425" y="2726325"/>
+            <a:ext cx="3727200" cy="934800"/>
+          </a:xfrm>
+          <a:prstGeom prst="rect">
+            <a:avLst/>
+          </a:prstGeom>
+        </p:spPr>
+        <p:txBody>
+          <a:bodyPr anchorCtr="0" anchor="t" bIns="91425" lIns="91425" spcFirstLastPara="1" rIns="91425" wrap="square" tIns="91425">
+            <a:noAutofit/>
+          </a:bodyPr>
+          <a:lstStyle/>
+          <a:p>
+            <a:pPr indent="0" lvl="0" marL="0" rtl="0" algn="l">
+              <a:spcBef>
+                <a:spcPts val="0"/>
+              </a:spcBef>
+              <a:spcAft>
+                <a:spcPts val="1200"/>
+              </a:spcAft>
+              <a:buNone/>
+            </a:pPr>
+            <a:r>
+              <a:rPr lang="en"/>
+              <a:t>It contains data from patients admitted to </a:t>
+            </a:r>
+            <a:r>
+              <a:rPr lang="en"/>
+              <a:t>Beth Israel Deaconess Medical Center</a:t>
             </a:r>
             <a:endParaRPr/>
           </a:p>
@@ -20661,7 +22009,7 @@
           <p:nvPr/>
         </p:nvPicPr>
         <p:blipFill>
-          <a:blip r:embed="rId3">
+          <a:blip r:embed="rId4">
             <a:alphaModFix/>
           </a:blip>
           <a:stretch>
@@ -20707,33 +22055,210 @@
           <a:chExt cx="0" cy="0"/>
         </a:xfrm>
       </p:grpSpPr>
-      <p:pic>
-        <p:nvPicPr>
+      <p:sp>
+        <p:nvSpPr>
           <p:cNvPr id="221" name="Google Shape;221;p34"/>
-          <p:cNvPicPr preferRelativeResize="0"/>
+          <p:cNvSpPr txBox="1"/>
           <p:nvPr>
-            <p:ph idx="2" type="pic"/>
+            <p:ph idx="1" type="subTitle"/>
           </p:nvPr>
-        </p:nvPicPr>
-        <p:blipFill rotWithShape="1">
-          <a:blip r:embed="rId3">
-            <a:alphaModFix/>
-          </a:blip>
-          <a:srcRect b="0" l="27736" r="27741" t="0"/>
-          <a:stretch/>
-        </p:blipFill>
+        </p:nvSpPr>
         <p:spPr>
           <a:xfrm>
-            <a:off x="0" y="0"/>
-            <a:ext cx="3432300" cy="5143500"/>
+            <a:off x="383075" y="1631475"/>
+            <a:ext cx="7753500" cy="407400"/>
           </a:xfrm>
-          <a:prstGeom prst="roundRect">
-            <a:avLst>
-              <a:gd fmla="val 16667" name="adj"/>
-            </a:avLst>
+          <a:prstGeom prst="rect">
+            <a:avLst/>
           </a:prstGeom>
         </p:spPr>
-      </p:pic>
+        <p:txBody>
+          <a:bodyPr anchorCtr="0" anchor="t" bIns="91425" lIns="91425" spcFirstLastPara="1" rIns="91425" wrap="square" tIns="91425">
+            <a:noAutofit/>
+          </a:bodyPr>
+          <a:lstStyle/>
+          <a:p>
+            <a:pPr indent="-304800" lvl="0" marL="457200" rtl="0" algn="l">
+              <a:lnSpc>
+                <a:spcPct val="110000"/>
+              </a:lnSpc>
+              <a:spcBef>
+                <a:spcPts val="0"/>
+              </a:spcBef>
+              <a:spcAft>
+                <a:spcPts val="0"/>
+              </a:spcAft>
+              <a:buSzPts val="1200"/>
+              <a:buChar char="●"/>
+            </a:pPr>
+            <a:r>
+              <a:rPr lang="en"/>
+              <a:t>Python</a:t>
+            </a:r>
+            <a:endParaRPr/>
+          </a:p>
+          <a:p>
+            <a:pPr indent="-304800" lvl="0" marL="457200" rtl="0" algn="l">
+              <a:lnSpc>
+                <a:spcPct val="110000"/>
+              </a:lnSpc>
+              <a:spcBef>
+                <a:spcPts val="0"/>
+              </a:spcBef>
+              <a:spcAft>
+                <a:spcPts val="0"/>
+              </a:spcAft>
+              <a:buSzPts val="1200"/>
+              <a:buChar char="●"/>
+            </a:pPr>
+            <a:r>
+              <a:rPr lang="en"/>
+              <a:t>Pandas</a:t>
+            </a:r>
+            <a:endParaRPr/>
+          </a:p>
+          <a:p>
+            <a:pPr indent="-304800" lvl="0" marL="457200" rtl="0" algn="l">
+              <a:lnSpc>
+                <a:spcPct val="110000"/>
+              </a:lnSpc>
+              <a:spcBef>
+                <a:spcPts val="0"/>
+              </a:spcBef>
+              <a:spcAft>
+                <a:spcPts val="0"/>
+              </a:spcAft>
+              <a:buSzPts val="1200"/>
+              <a:buChar char="●"/>
+            </a:pPr>
+            <a:r>
+              <a:rPr lang="en"/>
+              <a:t>Scikit-learn</a:t>
+            </a:r>
+            <a:endParaRPr/>
+          </a:p>
+          <a:p>
+            <a:pPr indent="-304800" lvl="0" marL="457200" rtl="0" algn="l">
+              <a:lnSpc>
+                <a:spcPct val="110000"/>
+              </a:lnSpc>
+              <a:spcBef>
+                <a:spcPts val="0"/>
+              </a:spcBef>
+              <a:spcAft>
+                <a:spcPts val="0"/>
+              </a:spcAft>
+              <a:buSzPts val="1200"/>
+              <a:buChar char="●"/>
+            </a:pPr>
+            <a:r>
+              <a:rPr lang="en"/>
+              <a:t>Numpy</a:t>
+            </a:r>
+            <a:endParaRPr/>
+          </a:p>
+          <a:p>
+            <a:pPr indent="-304800" lvl="0" marL="457200" rtl="0" algn="l">
+              <a:lnSpc>
+                <a:spcPct val="110000"/>
+              </a:lnSpc>
+              <a:spcBef>
+                <a:spcPts val="0"/>
+              </a:spcBef>
+              <a:spcAft>
+                <a:spcPts val="0"/>
+              </a:spcAft>
+              <a:buSzPts val="1200"/>
+              <a:buChar char="●"/>
+            </a:pPr>
+            <a:r>
+              <a:rPr lang="en"/>
+              <a:t>Seaborn</a:t>
+            </a:r>
+            <a:endParaRPr/>
+          </a:p>
+          <a:p>
+            <a:pPr indent="-304800" lvl="0" marL="457200" rtl="0" algn="l">
+              <a:lnSpc>
+                <a:spcPct val="110000"/>
+              </a:lnSpc>
+              <a:spcBef>
+                <a:spcPts val="0"/>
+              </a:spcBef>
+              <a:spcAft>
+                <a:spcPts val="0"/>
+              </a:spcAft>
+              <a:buSzPts val="1200"/>
+              <a:buChar char="●"/>
+            </a:pPr>
+            <a:r>
+              <a:rPr lang="en"/>
+              <a:t>Matplotlib</a:t>
+            </a:r>
+            <a:endParaRPr/>
+          </a:p>
+          <a:p>
+            <a:pPr indent="-304800" lvl="0" marL="457200" rtl="0" algn="l">
+              <a:lnSpc>
+                <a:spcPct val="110000"/>
+              </a:lnSpc>
+              <a:spcBef>
+                <a:spcPts val="0"/>
+              </a:spcBef>
+              <a:spcAft>
+                <a:spcPts val="0"/>
+              </a:spcAft>
+              <a:buSzPts val="1200"/>
+              <a:buChar char="●"/>
+            </a:pPr>
+            <a:r>
+              <a:rPr lang="en"/>
+              <a:t>FastAPI</a:t>
+            </a:r>
+            <a:endParaRPr/>
+          </a:p>
+          <a:p>
+            <a:pPr indent="-304800" lvl="0" marL="457200" rtl="0" algn="l">
+              <a:lnSpc>
+                <a:spcPct val="110000"/>
+              </a:lnSpc>
+              <a:spcBef>
+                <a:spcPts val="0"/>
+              </a:spcBef>
+              <a:spcAft>
+                <a:spcPts val="0"/>
+              </a:spcAft>
+              <a:buSzPts val="1200"/>
+              <a:buChar char="●"/>
+            </a:pPr>
+            <a:r>
+              <a:rPr lang="en"/>
+              <a:t>Uvicorn</a:t>
+            </a:r>
+            <a:endParaRPr/>
+          </a:p>
+          <a:p>
+            <a:pPr indent="-304800" lvl="0" marL="457200" rtl="0" algn="l">
+              <a:lnSpc>
+                <a:spcPct val="110000"/>
+              </a:lnSpc>
+              <a:spcBef>
+                <a:spcPts val="0"/>
+              </a:spcBef>
+              <a:spcAft>
+                <a:spcPts val="0"/>
+              </a:spcAft>
+              <a:buSzPts val="1200"/>
+              <a:buChar char="●"/>
+            </a:pPr>
+            <a:r>
+              <a:rPr lang="en"/>
+              <a:t>W3 HTML Elements</a:t>
+            </a:r>
+            <a:endParaRPr/>
+          </a:p>
+        </p:txBody>
+      </p:sp>
       <p:sp>
         <p:nvSpPr>
           <p:cNvPr id="222" name="Google Shape;222;p34"/>
@@ -20744,8 +22269,8 @@
         </p:nvSpPr>
         <p:spPr>
           <a:xfrm>
-            <a:off x="4135200" y="650250"/>
-            <a:ext cx="4270500" cy="726900"/>
+            <a:off x="383075" y="900950"/>
+            <a:ext cx="7753500" cy="636000"/>
           </a:xfrm>
           <a:prstGeom prst="rect">
             <a:avLst/>
@@ -20768,91 +22293,7 @@
             </a:pPr>
             <a:r>
               <a:rPr lang="en"/>
-              <a:t>Data Sources</a:t>
-            </a:r>
-            <a:endParaRPr/>
-          </a:p>
-        </p:txBody>
-      </p:sp>
-      <p:sp>
-        <p:nvSpPr>
-          <p:cNvPr id="223" name="Google Shape;223;p34"/>
-          <p:cNvSpPr txBox="1"/>
-          <p:nvPr>
-            <p:ph idx="1" type="subTitle"/>
-          </p:nvPr>
-        </p:nvSpPr>
-        <p:spPr>
-          <a:xfrm>
-            <a:off x="4678425" y="1687125"/>
-            <a:ext cx="3727200" cy="934800"/>
-          </a:xfrm>
-          <a:prstGeom prst="rect">
-            <a:avLst/>
-          </a:prstGeom>
-        </p:spPr>
-        <p:txBody>
-          <a:bodyPr anchorCtr="0" anchor="t" bIns="91425" lIns="91425" spcFirstLastPara="1" rIns="91425" wrap="square" tIns="91425">
-            <a:noAutofit/>
-          </a:bodyPr>
-          <a:lstStyle/>
-          <a:p>
-            <a:pPr indent="0" lvl="0" marL="0" rtl="0" algn="l">
-              <a:spcBef>
-                <a:spcPts val="0"/>
-              </a:spcBef>
-              <a:spcAft>
-                <a:spcPts val="1200"/>
-              </a:spcAft>
-              <a:buNone/>
-            </a:pPr>
-            <a:r>
-              <a:rPr lang="en"/>
-              <a:t>MIMIC-IV Clinical Database: Provides comprehensive clinical information on patients</a:t>
-            </a:r>
-            <a:endParaRPr/>
-          </a:p>
-        </p:txBody>
-      </p:sp>
-      <p:sp>
-        <p:nvSpPr>
-          <p:cNvPr id="224" name="Google Shape;224;p34"/>
-          <p:cNvSpPr txBox="1"/>
-          <p:nvPr>
-            <p:ph idx="3" type="subTitle"/>
-          </p:nvPr>
-        </p:nvSpPr>
-        <p:spPr>
-          <a:xfrm>
-            <a:off x="4678425" y="2726325"/>
-            <a:ext cx="3727200" cy="934800"/>
-          </a:xfrm>
-          <a:prstGeom prst="rect">
-            <a:avLst/>
-          </a:prstGeom>
-        </p:spPr>
-        <p:txBody>
-          <a:bodyPr anchorCtr="0" anchor="t" bIns="91425" lIns="91425" spcFirstLastPara="1" rIns="91425" wrap="square" tIns="91425">
-            <a:noAutofit/>
-          </a:bodyPr>
-          <a:lstStyle/>
-          <a:p>
-            <a:pPr indent="0" lvl="0" marL="0" rtl="0" algn="l">
-              <a:spcBef>
-                <a:spcPts val="0"/>
-              </a:spcBef>
-              <a:spcAft>
-                <a:spcPts val="1200"/>
-              </a:spcAft>
-              <a:buNone/>
-            </a:pPr>
-            <a:r>
-              <a:rPr lang="en"/>
-              <a:t>It contains data from patients admitted to </a:t>
-            </a:r>
-            <a:r>
-              <a:rPr lang="en"/>
-              <a:t>Beth Israel Deaconess Medical Center</a:t>
+              <a:t>Technologies Used</a:t>
             </a:r>
             <a:endParaRPr/>
           </a:p>
@@ -20860,12 +22301,12 @@
       </p:sp>
       <p:pic>
         <p:nvPicPr>
-          <p:cNvPr id="225" name="Google Shape;225;p34"/>
+          <p:cNvPr id="223" name="Google Shape;223;p34"/>
           <p:cNvPicPr preferRelativeResize="0"/>
           <p:nvPr/>
         </p:nvPicPr>
         <p:blipFill>
-          <a:blip r:embed="rId4">
+          <a:blip r:embed="rId3">
             <a:alphaModFix/>
           </a:blip>
           <a:stretch>
@@ -20899,7 +22340,7 @@
   <p:cSld>
     <p:spTree>
       <p:nvGrpSpPr>
-        <p:cNvPr id="229" name="Shape 229"/>
+        <p:cNvPr id="227" name="Shape 227"/>
         <p:cNvGrpSpPr/>
         <p:nvPr/>
       </p:nvGrpSpPr>
@@ -20913,7 +22354,7 @@
       </p:grpSpPr>
       <p:pic>
         <p:nvPicPr>
-          <p:cNvPr id="230" name="Google Shape;230;p35"/>
+          <p:cNvPr id="228" name="Google Shape;228;p35"/>
           <p:cNvPicPr preferRelativeResize="0"/>
           <p:nvPr>
             <p:ph idx="2" type="pic"/>
@@ -20923,7 +22364,7 @@
           <a:blip r:embed="rId3">
             <a:alphaModFix/>
           </a:blip>
-          <a:srcRect b="0" l="27711" r="27715" t="0"/>
+          <a:srcRect b="0" l="24973" r="24978" t="0"/>
           <a:stretch/>
         </p:blipFill>
         <p:spPr>
@@ -20940,7 +22381,7 @@
       </p:pic>
       <p:sp>
         <p:nvSpPr>
-          <p:cNvPr id="231" name="Google Shape;231;p35"/>
+          <p:cNvPr id="229" name="Google Shape;229;p35"/>
           <p:cNvSpPr txBox="1"/>
           <p:nvPr>
             <p:ph type="title"/>
@@ -20972,7 +22413,7 @@
             </a:pPr>
             <a:r>
               <a:rPr lang="en"/>
-              <a:t>Models</a:t>
+              <a:t>Proposed Solution</a:t>
             </a:r>
             <a:endParaRPr/>
           </a:p>
@@ -20980,7 +22421,7 @@
       </p:sp>
       <p:sp>
         <p:nvSpPr>
-          <p:cNvPr id="232" name="Google Shape;232;p35"/>
+          <p:cNvPr id="230" name="Google Shape;230;p35"/>
           <p:cNvSpPr txBox="1"/>
           <p:nvPr>
             <p:ph idx="1" type="subTitle"/>
@@ -21016,7 +22457,7 @@
             </a:pPr>
             <a:r>
               <a:rPr lang="en"/>
-              <a:t>Length of Stay: Random Forest Regression Model that explains 78% of the variance in the target variable</a:t>
+              <a:t>Develop a model that can predict aspects of patient stay, including duration and risk of death</a:t>
             </a:r>
             <a:endParaRPr/>
           </a:p>
@@ -21036,7 +22477,7 @@
             </a:pPr>
             <a:r>
               <a:rPr lang="en"/>
-              <a:t>Death Prediction: Logistic Regression Model with 98% classification accuracy</a:t>
+              <a:t>By having a better understanding of patient needs, hospitals can plan for resource allocation</a:t>
             </a:r>
             <a:endParaRPr/>
           </a:p>
@@ -21056,7 +22497,7 @@
             </a:pPr>
             <a:r>
               <a:rPr lang="en"/>
-              <a:t>Readmissions: Random Forest Classifier with 84% accuracy</a:t>
+              <a:t>This model will leverage patient information to make accurate predictions</a:t>
             </a:r>
             <a:endParaRPr/>
           </a:p>
@@ -21064,7 +22505,7 @@
       </p:sp>
       <p:pic>
         <p:nvPicPr>
-          <p:cNvPr id="233" name="Google Shape;233;p35"/>
+          <p:cNvPr id="231" name="Google Shape;231;p35"/>
           <p:cNvPicPr preferRelativeResize="0"/>
           <p:nvPr/>
         </p:nvPicPr>
@@ -21103,7 +22544,7 @@
   <p:cSld>
     <p:spTree>
       <p:nvGrpSpPr>
-        <p:cNvPr id="237" name="Shape 237"/>
+        <p:cNvPr id="235" name="Shape 235"/>
         <p:cNvGrpSpPr/>
         <p:nvPr/>
       </p:nvGrpSpPr>
@@ -21117,167 +22558,7 @@
       </p:grpSpPr>
       <p:sp>
         <p:nvSpPr>
-          <p:cNvPr id="238" name="Google Shape;238;p36"/>
-          <p:cNvSpPr txBox="1"/>
-          <p:nvPr>
-            <p:ph idx="1" type="subTitle"/>
-          </p:nvPr>
-        </p:nvSpPr>
-        <p:spPr>
-          <a:xfrm>
-            <a:off x="467425" y="1394975"/>
-            <a:ext cx="2198400" cy="1216200"/>
-          </a:xfrm>
-          <a:prstGeom prst="rect">
-            <a:avLst/>
-          </a:prstGeom>
-        </p:spPr>
-        <p:txBody>
-          <a:bodyPr anchorCtr="0" anchor="t" bIns="91425" lIns="91425" spcFirstLastPara="1" rIns="91425" wrap="square" tIns="91425">
-            <a:noAutofit/>
-          </a:bodyPr>
-          <a:lstStyle/>
-          <a:p>
-            <a:pPr indent="0" lvl="0" marL="0" rtl="0" algn="r">
-              <a:spcBef>
-                <a:spcPts val="0"/>
-              </a:spcBef>
-              <a:spcAft>
-                <a:spcPts val="1200"/>
-              </a:spcAft>
-              <a:buNone/>
-            </a:pPr>
-            <a:r>
-              <a:rPr lang="en"/>
-              <a:t>The CHOP Model demonstrates the potential of machine learning in healthcare</a:t>
-            </a:r>
-            <a:endParaRPr/>
-          </a:p>
-        </p:txBody>
-      </p:sp>
-      <p:sp>
-        <p:nvSpPr>
-          <p:cNvPr id="239" name="Google Shape;239;p36"/>
-          <p:cNvSpPr txBox="1"/>
-          <p:nvPr>
-            <p:ph idx="2" type="subTitle"/>
-          </p:nvPr>
-        </p:nvSpPr>
-        <p:spPr>
-          <a:xfrm>
-            <a:off x="467425" y="3096425"/>
-            <a:ext cx="2198400" cy="1216200"/>
-          </a:xfrm>
-          <a:prstGeom prst="rect">
-            <a:avLst/>
-          </a:prstGeom>
-        </p:spPr>
-        <p:txBody>
-          <a:bodyPr anchorCtr="0" anchor="t" bIns="91425" lIns="91425" spcFirstLastPara="1" rIns="91425" wrap="square" tIns="91425">
-            <a:noAutofit/>
-          </a:bodyPr>
-          <a:lstStyle/>
-          <a:p>
-            <a:pPr indent="0" lvl="0" marL="0" rtl="0" algn="r">
-              <a:spcBef>
-                <a:spcPts val="0"/>
-              </a:spcBef>
-              <a:spcAft>
-                <a:spcPts val="1200"/>
-              </a:spcAft>
-              <a:buNone/>
-            </a:pPr>
-            <a:r>
-              <a:rPr lang="en"/>
-              <a:t>Improves patient outcomes and optimizes resource allocation</a:t>
-            </a:r>
-            <a:endParaRPr/>
-          </a:p>
-        </p:txBody>
-      </p:sp>
-      <p:sp>
-        <p:nvSpPr>
-          <p:cNvPr id="240" name="Google Shape;240;p36"/>
-          <p:cNvSpPr txBox="1"/>
-          <p:nvPr>
-            <p:ph idx="3" type="subTitle"/>
-          </p:nvPr>
-        </p:nvSpPr>
-        <p:spPr>
-          <a:xfrm>
-            <a:off x="6302925" y="1394975"/>
-            <a:ext cx="2277300" cy="1212300"/>
-          </a:xfrm>
-          <a:prstGeom prst="rect">
-            <a:avLst/>
-          </a:prstGeom>
-        </p:spPr>
-        <p:txBody>
-          <a:bodyPr anchorCtr="0" anchor="t" bIns="91425" lIns="91425" spcFirstLastPara="1" rIns="91425" wrap="square" tIns="91425">
-            <a:noAutofit/>
-          </a:bodyPr>
-          <a:lstStyle/>
-          <a:p>
-            <a:pPr indent="0" lvl="0" marL="0" rtl="0" algn="l">
-              <a:spcBef>
-                <a:spcPts val="0"/>
-              </a:spcBef>
-              <a:spcAft>
-                <a:spcPts val="1200"/>
-              </a:spcAft>
-              <a:buNone/>
-            </a:pPr>
-            <a:r>
-              <a:rPr lang="en"/>
-              <a:t>Historical data provides actionable insights for informed decision-making</a:t>
-            </a:r>
-            <a:endParaRPr/>
-          </a:p>
-        </p:txBody>
-      </p:sp>
-      <p:sp>
-        <p:nvSpPr>
-          <p:cNvPr id="241" name="Google Shape;241;p36"/>
-          <p:cNvSpPr txBox="1"/>
-          <p:nvPr>
-            <p:ph idx="4" type="subTitle"/>
-          </p:nvPr>
-        </p:nvSpPr>
-        <p:spPr>
-          <a:xfrm>
-            <a:off x="6302925" y="3096425"/>
-            <a:ext cx="2277300" cy="1212300"/>
-          </a:xfrm>
-          <a:prstGeom prst="rect">
-            <a:avLst/>
-          </a:prstGeom>
-        </p:spPr>
-        <p:txBody>
-          <a:bodyPr anchorCtr="0" anchor="t" bIns="91425" lIns="91425" spcFirstLastPara="1" rIns="91425" wrap="square" tIns="91425">
-            <a:noAutofit/>
-          </a:bodyPr>
-          <a:lstStyle/>
-          <a:p>
-            <a:pPr indent="0" lvl="0" marL="0" rtl="0" algn="l">
-              <a:spcBef>
-                <a:spcPts val="0"/>
-              </a:spcBef>
-              <a:spcAft>
-                <a:spcPts val="1200"/>
-              </a:spcAft>
-              <a:buNone/>
-            </a:pPr>
-            <a:r>
-              <a:rPr lang="en"/>
-              <a:t>Demo dashboard provides useful metrics for hospital administrators</a:t>
-            </a:r>
-            <a:endParaRPr/>
-          </a:p>
-        </p:txBody>
-      </p:sp>
-      <p:sp>
-        <p:nvSpPr>
-          <p:cNvPr id="242" name="Google Shape;242;p36"/>
+          <p:cNvPr id="236" name="Google Shape;236;p36"/>
           <p:cNvSpPr txBox="1"/>
           <p:nvPr>
             <p:ph type="title"/>
@@ -21285,8 +22566,8 @@
         </p:nvSpPr>
         <p:spPr>
           <a:xfrm>
-            <a:off x="1245150" y="401725"/>
-            <a:ext cx="6653700" cy="423600"/>
+            <a:off x="632175" y="650250"/>
+            <a:ext cx="5046000" cy="726900"/>
           </a:xfrm>
           <a:prstGeom prst="rect">
             <a:avLst/>
@@ -21298,7 +22579,7 @@
           </a:bodyPr>
           <a:lstStyle/>
           <a:p>
-            <a:pPr indent="0" lvl="0" marL="0" rtl="0" algn="ctr">
+            <a:pPr indent="0" lvl="0" marL="0" rtl="0" algn="l">
               <a:spcBef>
                 <a:spcPts val="0"/>
               </a:spcBef>
@@ -21309,7 +22590,7 @@
             </a:pPr>
             <a:r>
               <a:rPr lang="en"/>
-              <a:t>Conclusion</a:t>
+              <a:t>EDA Length of Stay Findings</a:t>
             </a:r>
             <a:endParaRPr/>
           </a:p>
@@ -21317,7 +22598,7 @@
       </p:sp>
       <p:pic>
         <p:nvPicPr>
-          <p:cNvPr id="243" name="Google Shape;243;p36"/>
+          <p:cNvPr id="237" name="Google Shape;237;p36"/>
           <p:cNvPicPr preferRelativeResize="0"/>
           <p:nvPr/>
         </p:nvPicPr>
@@ -21343,6 +22624,92 @@
           </a:ln>
         </p:spPr>
       </p:pic>
+      <p:pic>
+        <p:nvPicPr>
+          <p:cNvPr id="238" name="Google Shape;238;p36"/>
+          <p:cNvPicPr preferRelativeResize="0"/>
+          <p:nvPr/>
+        </p:nvPicPr>
+        <p:blipFill>
+          <a:blip r:embed="rId4">
+            <a:alphaModFix/>
+          </a:blip>
+          <a:stretch>
+            <a:fillRect/>
+          </a:stretch>
+        </p:blipFill>
+        <p:spPr>
+          <a:xfrm>
+            <a:off x="152400" y="1529550"/>
+            <a:ext cx="5313077" cy="3461550"/>
+          </a:xfrm>
+          <a:prstGeom prst="rect">
+            <a:avLst/>
+          </a:prstGeom>
+          <a:noFill/>
+          <a:ln>
+            <a:noFill/>
+          </a:ln>
+        </p:spPr>
+      </p:pic>
+      <p:sp>
+        <p:nvSpPr>
+          <p:cNvPr id="239" name="Google Shape;239;p36"/>
+          <p:cNvSpPr txBox="1"/>
+          <p:nvPr/>
+        </p:nvSpPr>
+        <p:spPr>
+          <a:xfrm>
+            <a:off x="5609750" y="1568950"/>
+            <a:ext cx="3374700" cy="3422100"/>
+          </a:xfrm>
+          <a:prstGeom prst="rect">
+            <a:avLst/>
+          </a:prstGeom>
+          <a:noFill/>
+          <a:ln>
+            <a:noFill/>
+          </a:ln>
+        </p:spPr>
+        <p:txBody>
+          <a:bodyPr anchorCtr="0" anchor="t" bIns="91425" lIns="91425" spcFirstLastPara="1" rIns="91425" wrap="square" tIns="91425">
+            <a:noAutofit/>
+          </a:bodyPr>
+          <a:lstStyle/>
+          <a:p>
+            <a:pPr indent="0" lvl="0" marL="0" rtl="0" algn="l">
+              <a:spcBef>
+                <a:spcPts val="0"/>
+              </a:spcBef>
+              <a:spcAft>
+                <a:spcPts val="0"/>
+              </a:spcAft>
+              <a:buNone/>
+            </a:pPr>
+            <a:r>
+              <a:rPr lang="en" sz="1800">
+                <a:solidFill>
+                  <a:schemeClr val="dk2"/>
+                </a:solidFill>
+                <a:latin typeface="Inter Medium"/>
+                <a:ea typeface="Inter Medium"/>
+                <a:cs typeface="Inter Medium"/>
+                <a:sym typeface="Inter Medium"/>
+              </a:rPr>
+              <a:t>On examining the distribution of the length of stay variable we found the vast majority of stays were 5 days or less.</a:t>
+            </a:r>
+            <a:endParaRPr sz="1800">
+              <a:solidFill>
+                <a:schemeClr val="dk2"/>
+              </a:solidFill>
+              <a:latin typeface="Inter Medium"/>
+              <a:ea typeface="Inter Medium"/>
+              <a:cs typeface="Inter Medium"/>
+              <a:sym typeface="Inter Medium"/>
+            </a:endParaRPr>
+          </a:p>
+        </p:txBody>
+      </p:sp>
     </p:spTree>
   </p:cSld>
   <p:clrMapOvr>
@@ -21356,7 +22723,7 @@
   <p:cSld>
     <p:spTree>
       <p:nvGrpSpPr>
-        <p:cNvPr id="247" name="Shape 247"/>
+        <p:cNvPr id="243" name="Shape 243"/>
         <p:cNvGrpSpPr/>
         <p:nvPr/>
       </p:nvGrpSpPr>
@@ -21370,7 +22737,7 @@
       </p:grpSpPr>
       <p:sp>
         <p:nvSpPr>
-          <p:cNvPr id="248" name="Google Shape;248;p37"/>
+          <p:cNvPr id="244" name="Google Shape;244;p37"/>
           <p:cNvSpPr txBox="1"/>
           <p:nvPr>
             <p:ph type="title"/>
@@ -21378,8 +22745,8 @@
         </p:nvSpPr>
         <p:spPr>
           <a:xfrm>
-            <a:off x="530400" y="2208300"/>
-            <a:ext cx="8083200" cy="726900"/>
+            <a:off x="632175" y="650250"/>
+            <a:ext cx="5046000" cy="726900"/>
           </a:xfrm>
           <a:prstGeom prst="rect">
             <a:avLst/>
@@ -21391,7 +22758,7 @@
           </a:bodyPr>
           <a:lstStyle/>
           <a:p>
-            <a:pPr indent="0" lvl="0" marL="0" rtl="0" algn="ctr">
+            <a:pPr indent="0" lvl="0" marL="0" rtl="0" algn="l">
               <a:spcBef>
                 <a:spcPts val="0"/>
               </a:spcBef>
@@ -21402,7 +22769,7 @@
             </a:pPr>
             <a:r>
               <a:rPr lang="en"/>
-              <a:t>Thank you for your time and attention 🙂</a:t>
+              <a:t>EDA Readmission Findings</a:t>
             </a:r>
             <a:endParaRPr/>
           </a:p>
@@ -21410,7 +22777,7 @@
       </p:sp>
       <p:pic>
         <p:nvPicPr>
-          <p:cNvPr id="249" name="Google Shape;249;p37"/>
+          <p:cNvPr id="245" name="Google Shape;245;p37"/>
           <p:cNvPicPr preferRelativeResize="0"/>
           <p:nvPr/>
         </p:nvPicPr>
@@ -21436,6 +22803,115 @@
           </a:ln>
         </p:spPr>
       </p:pic>
+      <p:pic>
+        <p:nvPicPr>
+          <p:cNvPr id="246" name="Google Shape;246;p37"/>
+          <p:cNvPicPr preferRelativeResize="0"/>
+          <p:nvPr/>
+        </p:nvPicPr>
+        <p:blipFill rotWithShape="1">
+          <a:blip r:embed="rId4">
+            <a:alphaModFix/>
+          </a:blip>
+          <a:srcRect b="960" l="0" r="0" t="0"/>
+          <a:stretch/>
+        </p:blipFill>
+        <p:spPr>
+          <a:xfrm>
+            <a:off x="152400" y="1385200"/>
+            <a:ext cx="5313074" cy="3713900"/>
+          </a:xfrm>
+          <a:prstGeom prst="rect">
+            <a:avLst/>
+          </a:prstGeom>
+          <a:noFill/>
+          <a:ln>
+            <a:noFill/>
+          </a:ln>
+        </p:spPr>
+      </p:pic>
+      <p:sp>
+        <p:nvSpPr>
+          <p:cNvPr id="247" name="Google Shape;247;p37"/>
+          <p:cNvSpPr txBox="1"/>
+          <p:nvPr/>
+        </p:nvSpPr>
+        <p:spPr>
+          <a:xfrm>
+            <a:off x="5609750" y="1568950"/>
+            <a:ext cx="3374700" cy="3422100"/>
+          </a:xfrm>
+          <a:prstGeom prst="rect">
+            <a:avLst/>
+          </a:prstGeom>
+          <a:noFill/>
+          <a:ln>
+            <a:noFill/>
+          </a:ln>
+        </p:spPr>
+        <p:txBody>
+          <a:bodyPr anchorCtr="0" anchor="t" bIns="91425" lIns="91425" spcFirstLastPara="1" rIns="91425" wrap="square" tIns="91425">
+            <a:noAutofit/>
+          </a:bodyPr>
+          <a:lstStyle/>
+          <a:p>
+            <a:pPr indent="0" lvl="0" marL="0" rtl="0" algn="l">
+              <a:spcBef>
+                <a:spcPts val="0"/>
+              </a:spcBef>
+              <a:spcAft>
+                <a:spcPts val="0"/>
+              </a:spcAft>
+              <a:buNone/>
+            </a:pPr>
+            <a:r>
+              <a:rPr lang="en" sz="1800">
+                <a:solidFill>
+                  <a:schemeClr val="dk2"/>
+                </a:solidFill>
+                <a:latin typeface="Inter Medium"/>
+                <a:ea typeface="Inter Medium"/>
+                <a:cs typeface="Inter Medium"/>
+                <a:sym typeface="Inter Medium"/>
+              </a:rPr>
+              <a:t>The readmission variable shows no </a:t>
+            </a:r>
+            <a:r>
+              <a:rPr lang="en" sz="1800">
+                <a:solidFill>
+                  <a:schemeClr val="dk2"/>
+                </a:solidFill>
+                <a:latin typeface="Inter Medium"/>
+                <a:ea typeface="Inter Medium"/>
+                <a:cs typeface="Inter Medium"/>
+                <a:sym typeface="Inter Medium"/>
+              </a:rPr>
+              <a:t>discernible</a:t>
+            </a:r>
+            <a:r>
+              <a:rPr lang="en" sz="1800">
+                <a:solidFill>
+                  <a:schemeClr val="dk2"/>
+                </a:solidFill>
+                <a:latin typeface="Inter Medium"/>
+                <a:ea typeface="Inter Medium"/>
+                <a:cs typeface="Inter Medium"/>
+                <a:sym typeface="Inter Medium"/>
+              </a:rPr>
+              <a:t> patterns in terms of seasonality or raw numbers.</a:t>
+            </a:r>
+            <a:endParaRPr sz="1800">
+              <a:solidFill>
+                <a:schemeClr val="dk2"/>
+              </a:solidFill>
+              <a:latin typeface="Inter Medium"/>
+              <a:ea typeface="Inter Medium"/>
+              <a:cs typeface="Inter Medium"/>
+              <a:sym typeface="Inter Medium"/>
+            </a:endParaRPr>
+          </a:p>
+        </p:txBody>
+      </p:sp>
     </p:spTree>
   </p:cSld>
   <p:clrMapOvr>
@@ -21445,9 +22921,9 @@
 </file>
 
 <file path=ppt/theme/theme1.xml><?xml version="1.0" encoding="utf-8"?>
-<a:theme xmlns:a="http://schemas.openxmlformats.org/drawingml/2006/main" xmlns:r="http://schemas.openxmlformats.org/officeDocument/2006/relationships">
+<a:theme xmlns:a="http://schemas.openxmlformats.org/drawingml/2006/main" xmlns:r="http://schemas.openxmlformats.org/officeDocument/2006/relationships" name="Simple Light">
   <a:themeElements>
-    <a:clrScheme name="Default">
+    <a:clrScheme name="Simple Light">
       <a:dk1>
         <a:srgbClr val="000000"/>
       </a:dk1>
@@ -21455,34 +22931,34 @@
         <a:srgbClr val="FFFFFF"/>
       </a:lt1>
       <a:dk2>
-        <a:srgbClr val="158158"/>
+        <a:srgbClr val="595959"/>
       </a:dk2>
       <a:lt2>
-        <a:srgbClr val="F3F3F3"/>
+        <a:srgbClr val="EEEEEE"/>
       </a:lt2>
       <a:accent1>
-        <a:srgbClr val="058DC7"/>
+        <a:srgbClr val="4285F4"/>
       </a:accent1>
       <a:accent2>
-        <a:srgbClr val="50B432"/>
+        <a:srgbClr val="212121"/>
       </a:accent2>
       <a:accent3>
-        <a:srgbClr val="ED561B"/>
+        <a:srgbClr val="78909C"/>
       </a:accent3>
       <a:accent4>
-        <a:srgbClr val="EDEF00"/>
+        <a:srgbClr val="FFAB40"/>
       </a:accent4>
       <a:accent5>
-        <a:srgbClr val="24CBE5"/>
+        <a:srgbClr val="0097A7"/>
       </a:accent5>
       <a:accent6>
-        <a:srgbClr val="64E572"/>
+        <a:srgbClr val="EEFF41"/>
       </a:accent6>
       <a:hlink>
-        <a:srgbClr val="2200CC"/>
+        <a:srgbClr val="0097A7"/>
       </a:hlink>
       <a:folHlink>
-        <a:srgbClr val="551A8B"/>
+        <a:srgbClr val="0097A7"/>
       </a:folHlink>
     </a:clrScheme>
     <a:fontScheme name="Office">
@@ -21724,9 +23200,9 @@
 </file>
 
 <file path=ppt/theme/theme2.xml><?xml version="1.0" encoding="utf-8"?>
-<a:theme xmlns:a="http://schemas.openxmlformats.org/drawingml/2006/main" xmlns:r="http://schemas.openxmlformats.org/officeDocument/2006/relationships" name="Simple Light">
+<a:theme xmlns:a="http://schemas.openxmlformats.org/drawingml/2006/main" xmlns:r="http://schemas.openxmlformats.org/officeDocument/2006/relationships">
   <a:themeElements>
-    <a:clrScheme name="Simple Light">
+    <a:clrScheme name="Default">
       <a:dk1>
         <a:srgbClr val="000000"/>
       </a:dk1>
@@ -21734,34 +23210,34 @@
         <a:srgbClr val="FFFFFF"/>
       </a:lt1>
       <a:dk2>
-        <a:srgbClr val="595959"/>
+        <a:srgbClr val="158158"/>
       </a:dk2>
       <a:lt2>
-        <a:srgbClr val="EEEEEE"/>
+        <a:srgbClr val="F3F3F3"/>
       </a:lt2>
       <a:accent1>
-        <a:srgbClr val="4285F4"/>
+        <a:srgbClr val="058DC7"/>
       </a:accent1>
       <a:accent2>
-        <a:srgbClr val="212121"/>
+        <a:srgbClr val="50B432"/>
       </a:accent2>
       <a:accent3>
-        <a:srgbClr val="78909C"/>
+        <a:srgbClr val="ED561B"/>
       </a:accent3>
       <a:accent4>
-        <a:srgbClr val="FFAB40"/>
+        <a:srgbClr val="EDEF00"/>
       </a:accent4>
       <a:accent5>
-        <a:srgbClr val="0097A7"/>
+        <a:srgbClr val="24CBE5"/>
       </a:accent5>
       <a:accent6>
-        <a:srgbClr val="EEFF41"/>
+        <a:srgbClr val="64E572"/>
       </a:accent6>
       <a:hlink>
-        <a:srgbClr val="0097A7"/>
+        <a:srgbClr val="2200CC"/>
       </a:hlink>
       <a:folHlink>
-        <a:srgbClr val="0097A7"/>
+        <a:srgbClr val="551A8B"/>
       </a:folHlink>
     </a:clrScheme>
     <a:fontScheme name="Office">

</xml_diff>